<commit_message>
improved small notebook and presentation
</commit_message>
<xml_diff>
--- a/HOW2_presentation.pptx
+++ b/HOW2_presentation.pptx
@@ -4,6 +4,9 @@
   <p:sldMasterIdLst>
     <p:sldMasterId id="2147483882" r:id="rId1"/>
   </p:sldMasterIdLst>
+  <p:notesMasterIdLst>
+    <p:notesMasterId r:id="rId16"/>
+  </p:notesMasterIdLst>
   <p:sldIdLst>
     <p:sldId id="256" r:id="rId2"/>
     <p:sldId id="257" r:id="rId3"/>
@@ -12,7 +15,13 @@
     <p:sldId id="260" r:id="rId6"/>
     <p:sldId id="261" r:id="rId7"/>
     <p:sldId id="262" r:id="rId8"/>
-    <p:sldId id="263" r:id="rId9"/>
+    <p:sldId id="269" r:id="rId9"/>
+    <p:sldId id="263" r:id="rId10"/>
+    <p:sldId id="264" r:id="rId11"/>
+    <p:sldId id="265" r:id="rId12"/>
+    <p:sldId id="266" r:id="rId13"/>
+    <p:sldId id="268" r:id="rId14"/>
+    <p:sldId id="267" r:id="rId15"/>
   </p:sldIdLst>
   <p:sldSz cx="12192000" cy="6858000"/>
   <p:notesSz cx="6858000" cy="9144000"/>
@@ -119,6 +128,608 @@
 </p:presentation>
 </file>
 
+<file path=ppt/notesMasters/notesMaster1.xml><?xml version="1.0" encoding="utf-8"?>
+<p:notesMaster xmlns:a="http://schemas.openxmlformats.org/drawingml/2006/main" xmlns:r="http://schemas.openxmlformats.org/officeDocument/2006/relationships" xmlns:p="http://schemas.openxmlformats.org/presentationml/2006/main">
+  <p:cSld>
+    <p:bg>
+      <p:bgRef idx="1001">
+        <a:schemeClr val="bg1"/>
+      </p:bgRef>
+    </p:bg>
+    <p:spTree>
+      <p:nvGrpSpPr>
+        <p:cNvPr id="1" name=""/>
+        <p:cNvGrpSpPr/>
+        <p:nvPr/>
+      </p:nvGrpSpPr>
+      <p:grpSpPr>
+        <a:xfrm>
+          <a:off x="0" y="0"/>
+          <a:ext cx="0" cy="0"/>
+          <a:chOff x="0" y="0"/>
+          <a:chExt cx="0" cy="0"/>
+        </a:xfrm>
+      </p:grpSpPr>
+      <p:sp>
+        <p:nvSpPr>
+          <p:cNvPr id="2" name="Header Placeholder 1"/>
+          <p:cNvSpPr>
+            <a:spLocks noGrp="1"/>
+          </p:cNvSpPr>
+          <p:nvPr>
+            <p:ph type="hdr" sz="quarter"/>
+          </p:nvPr>
+        </p:nvSpPr>
+        <p:spPr>
+          <a:xfrm>
+            <a:off x="0" y="0"/>
+            <a:ext cx="2971800" cy="458788"/>
+          </a:xfrm>
+          <a:prstGeom prst="rect">
+            <a:avLst/>
+          </a:prstGeom>
+        </p:spPr>
+        <p:txBody>
+          <a:bodyPr vert="horz" lIns="91440" tIns="45720" rIns="91440" bIns="45720" rtlCol="0"/>
+          <a:lstStyle>
+            <a:lvl1pPr algn="l">
+              <a:defRPr sz="1200"/>
+            </a:lvl1pPr>
+          </a:lstStyle>
+          <a:p>
+            <a:endParaRPr lang="en-GB"/>
+          </a:p>
+        </p:txBody>
+      </p:sp>
+      <p:sp>
+        <p:nvSpPr>
+          <p:cNvPr id="3" name="Date Placeholder 2"/>
+          <p:cNvSpPr>
+            <a:spLocks noGrp="1"/>
+          </p:cNvSpPr>
+          <p:nvPr>
+            <p:ph type="dt" idx="1"/>
+          </p:nvPr>
+        </p:nvSpPr>
+        <p:spPr>
+          <a:xfrm>
+            <a:off x="3884613" y="0"/>
+            <a:ext cx="2971800" cy="458788"/>
+          </a:xfrm>
+          <a:prstGeom prst="rect">
+            <a:avLst/>
+          </a:prstGeom>
+        </p:spPr>
+        <p:txBody>
+          <a:bodyPr vert="horz" lIns="91440" tIns="45720" rIns="91440" bIns="45720" rtlCol="0"/>
+          <a:lstStyle>
+            <a:lvl1pPr algn="r">
+              <a:defRPr sz="1200"/>
+            </a:lvl1pPr>
+          </a:lstStyle>
+          <a:p>
+            <a:fld id="{8A9187C2-3B7C-4F5E-B9F0-1F85724503BB}" type="datetimeFigureOut">
+              <a:rPr lang="en-GB" smtClean="0"/>
+              <a:t>07/07/2022</a:t>
+            </a:fld>
+            <a:endParaRPr lang="en-GB"/>
+          </a:p>
+        </p:txBody>
+      </p:sp>
+      <p:sp>
+        <p:nvSpPr>
+          <p:cNvPr id="4" name="Slide Image Placeholder 3"/>
+          <p:cNvSpPr>
+            <a:spLocks noGrp="1" noRot="1" noChangeAspect="1"/>
+          </p:cNvSpPr>
+          <p:nvPr>
+            <p:ph type="sldImg" idx="2"/>
+          </p:nvPr>
+        </p:nvSpPr>
+        <p:spPr>
+          <a:xfrm>
+            <a:off x="685800" y="1143000"/>
+            <a:ext cx="5486400" cy="3086100"/>
+          </a:xfrm>
+          <a:prstGeom prst="rect">
+            <a:avLst/>
+          </a:prstGeom>
+          <a:noFill/>
+          <a:ln w="12700">
+            <a:solidFill>
+              <a:prstClr val="black"/>
+            </a:solidFill>
+          </a:ln>
+        </p:spPr>
+        <p:txBody>
+          <a:bodyPr vert="horz" lIns="91440" tIns="45720" rIns="91440" bIns="45720" rtlCol="0" anchor="ctr"/>
+          <a:lstStyle/>
+          <a:p>
+            <a:endParaRPr lang="en-GB"/>
+          </a:p>
+        </p:txBody>
+      </p:sp>
+      <p:sp>
+        <p:nvSpPr>
+          <p:cNvPr id="5" name="Notes Placeholder 4"/>
+          <p:cNvSpPr>
+            <a:spLocks noGrp="1"/>
+          </p:cNvSpPr>
+          <p:nvPr>
+            <p:ph type="body" sz="quarter" idx="3"/>
+          </p:nvPr>
+        </p:nvSpPr>
+        <p:spPr>
+          <a:xfrm>
+            <a:off x="685800" y="4400550"/>
+            <a:ext cx="5486400" cy="3600450"/>
+          </a:xfrm>
+          <a:prstGeom prst="rect">
+            <a:avLst/>
+          </a:prstGeom>
+        </p:spPr>
+        <p:txBody>
+          <a:bodyPr vert="horz" lIns="91440" tIns="45720" rIns="91440" bIns="45720" rtlCol="0"/>
+          <a:lstStyle/>
+          <a:p>
+            <a:pPr lvl="0"/>
+            <a:r>
+              <a:rPr lang="en-US"/>
+              <a:t>Click to edit Master text styles</a:t>
+            </a:r>
+          </a:p>
+          <a:p>
+            <a:pPr lvl="1"/>
+            <a:r>
+              <a:rPr lang="en-US"/>
+              <a:t>Second level</a:t>
+            </a:r>
+          </a:p>
+          <a:p>
+            <a:pPr lvl="2"/>
+            <a:r>
+              <a:rPr lang="en-US"/>
+              <a:t>Third level</a:t>
+            </a:r>
+          </a:p>
+          <a:p>
+            <a:pPr lvl="3"/>
+            <a:r>
+              <a:rPr lang="en-US"/>
+              <a:t>Fourth level</a:t>
+            </a:r>
+          </a:p>
+          <a:p>
+            <a:pPr lvl="4"/>
+            <a:r>
+              <a:rPr lang="en-US"/>
+              <a:t>Fifth level</a:t>
+            </a:r>
+            <a:endParaRPr lang="en-GB"/>
+          </a:p>
+        </p:txBody>
+      </p:sp>
+      <p:sp>
+        <p:nvSpPr>
+          <p:cNvPr id="6" name="Footer Placeholder 5"/>
+          <p:cNvSpPr>
+            <a:spLocks noGrp="1"/>
+          </p:cNvSpPr>
+          <p:nvPr>
+            <p:ph type="ftr" sz="quarter" idx="4"/>
+          </p:nvPr>
+        </p:nvSpPr>
+        <p:spPr>
+          <a:xfrm>
+            <a:off x="0" y="8685213"/>
+            <a:ext cx="2971800" cy="458787"/>
+          </a:xfrm>
+          <a:prstGeom prst="rect">
+            <a:avLst/>
+          </a:prstGeom>
+        </p:spPr>
+        <p:txBody>
+          <a:bodyPr vert="horz" lIns="91440" tIns="45720" rIns="91440" bIns="45720" rtlCol="0" anchor="b"/>
+          <a:lstStyle>
+            <a:lvl1pPr algn="l">
+              <a:defRPr sz="1200"/>
+            </a:lvl1pPr>
+          </a:lstStyle>
+          <a:p>
+            <a:endParaRPr lang="en-GB"/>
+          </a:p>
+        </p:txBody>
+      </p:sp>
+      <p:sp>
+        <p:nvSpPr>
+          <p:cNvPr id="7" name="Slide Number Placeholder 6"/>
+          <p:cNvSpPr>
+            <a:spLocks noGrp="1"/>
+          </p:cNvSpPr>
+          <p:nvPr>
+            <p:ph type="sldNum" sz="quarter" idx="5"/>
+          </p:nvPr>
+        </p:nvSpPr>
+        <p:spPr>
+          <a:xfrm>
+            <a:off x="3884613" y="8685213"/>
+            <a:ext cx="2971800" cy="458787"/>
+          </a:xfrm>
+          <a:prstGeom prst="rect">
+            <a:avLst/>
+          </a:prstGeom>
+        </p:spPr>
+        <p:txBody>
+          <a:bodyPr vert="horz" lIns="91440" tIns="45720" rIns="91440" bIns="45720" rtlCol="0" anchor="b"/>
+          <a:lstStyle>
+            <a:lvl1pPr algn="r">
+              <a:defRPr sz="1200"/>
+            </a:lvl1pPr>
+          </a:lstStyle>
+          <a:p>
+            <a:fld id="{D34E1024-1B4F-464D-BD88-F1D57E23A3C1}" type="slidenum">
+              <a:rPr lang="en-GB" smtClean="0"/>
+              <a:t>‹#›</a:t>
+            </a:fld>
+            <a:endParaRPr lang="en-GB"/>
+          </a:p>
+        </p:txBody>
+      </p:sp>
+    </p:spTree>
+    <p:extLst>
+      <p:ext uri="{BB962C8B-B14F-4D97-AF65-F5344CB8AC3E}">
+        <p14:creationId xmlns:p14="http://schemas.microsoft.com/office/powerpoint/2010/main" val="11379542"/>
+      </p:ext>
+    </p:extLst>
+  </p:cSld>
+  <p:clrMap bg1="lt1" tx1="dk1" bg2="lt2" tx2="dk2" accent1="accent1" accent2="accent2" accent3="accent3" accent4="accent4" accent5="accent5" accent6="accent6" hlink="hlink" folHlink="folHlink"/>
+  <p:notesStyle>
+    <a:lvl1pPr marL="0" algn="l" defTabSz="914400" rtl="0" eaLnBrk="1" latinLnBrk="0" hangingPunct="1">
+      <a:defRPr sz="1200" kern="1200">
+        <a:solidFill>
+          <a:schemeClr val="tx1"/>
+        </a:solidFill>
+        <a:latin typeface="+mn-lt"/>
+        <a:ea typeface="+mn-ea"/>
+        <a:cs typeface="+mn-cs"/>
+      </a:defRPr>
+    </a:lvl1pPr>
+    <a:lvl2pPr marL="457200" algn="l" defTabSz="914400" rtl="0" eaLnBrk="1" latinLnBrk="0" hangingPunct="1">
+      <a:defRPr sz="1200" kern="1200">
+        <a:solidFill>
+          <a:schemeClr val="tx1"/>
+        </a:solidFill>
+        <a:latin typeface="+mn-lt"/>
+        <a:ea typeface="+mn-ea"/>
+        <a:cs typeface="+mn-cs"/>
+      </a:defRPr>
+    </a:lvl2pPr>
+    <a:lvl3pPr marL="914400" algn="l" defTabSz="914400" rtl="0" eaLnBrk="1" latinLnBrk="0" hangingPunct="1">
+      <a:defRPr sz="1200" kern="1200">
+        <a:solidFill>
+          <a:schemeClr val="tx1"/>
+        </a:solidFill>
+        <a:latin typeface="+mn-lt"/>
+        <a:ea typeface="+mn-ea"/>
+        <a:cs typeface="+mn-cs"/>
+      </a:defRPr>
+    </a:lvl3pPr>
+    <a:lvl4pPr marL="1371600" algn="l" defTabSz="914400" rtl="0" eaLnBrk="1" latinLnBrk="0" hangingPunct="1">
+      <a:defRPr sz="1200" kern="1200">
+        <a:solidFill>
+          <a:schemeClr val="tx1"/>
+        </a:solidFill>
+        <a:latin typeface="+mn-lt"/>
+        <a:ea typeface="+mn-ea"/>
+        <a:cs typeface="+mn-cs"/>
+      </a:defRPr>
+    </a:lvl4pPr>
+    <a:lvl5pPr marL="1828800" algn="l" defTabSz="914400" rtl="0" eaLnBrk="1" latinLnBrk="0" hangingPunct="1">
+      <a:defRPr sz="1200" kern="1200">
+        <a:solidFill>
+          <a:schemeClr val="tx1"/>
+        </a:solidFill>
+        <a:latin typeface="+mn-lt"/>
+        <a:ea typeface="+mn-ea"/>
+        <a:cs typeface="+mn-cs"/>
+      </a:defRPr>
+    </a:lvl5pPr>
+    <a:lvl6pPr marL="2286000" algn="l" defTabSz="914400" rtl="0" eaLnBrk="1" latinLnBrk="0" hangingPunct="1">
+      <a:defRPr sz="1200" kern="1200">
+        <a:solidFill>
+          <a:schemeClr val="tx1"/>
+        </a:solidFill>
+        <a:latin typeface="+mn-lt"/>
+        <a:ea typeface="+mn-ea"/>
+        <a:cs typeface="+mn-cs"/>
+      </a:defRPr>
+    </a:lvl6pPr>
+    <a:lvl7pPr marL="2743200" algn="l" defTabSz="914400" rtl="0" eaLnBrk="1" latinLnBrk="0" hangingPunct="1">
+      <a:defRPr sz="1200" kern="1200">
+        <a:solidFill>
+          <a:schemeClr val="tx1"/>
+        </a:solidFill>
+        <a:latin typeface="+mn-lt"/>
+        <a:ea typeface="+mn-ea"/>
+        <a:cs typeface="+mn-cs"/>
+      </a:defRPr>
+    </a:lvl7pPr>
+    <a:lvl8pPr marL="3200400" algn="l" defTabSz="914400" rtl="0" eaLnBrk="1" latinLnBrk="0" hangingPunct="1">
+      <a:defRPr sz="1200" kern="1200">
+        <a:solidFill>
+          <a:schemeClr val="tx1"/>
+        </a:solidFill>
+        <a:latin typeface="+mn-lt"/>
+        <a:ea typeface="+mn-ea"/>
+        <a:cs typeface="+mn-cs"/>
+      </a:defRPr>
+    </a:lvl8pPr>
+    <a:lvl9pPr marL="3657600" algn="l" defTabSz="914400" rtl="0" eaLnBrk="1" latinLnBrk="0" hangingPunct="1">
+      <a:defRPr sz="1200" kern="1200">
+        <a:solidFill>
+          <a:schemeClr val="tx1"/>
+        </a:solidFill>
+        <a:latin typeface="+mn-lt"/>
+        <a:ea typeface="+mn-ea"/>
+        <a:cs typeface="+mn-cs"/>
+      </a:defRPr>
+    </a:lvl9pPr>
+  </p:notesStyle>
+</p:notesMaster>
+</file>
+
+<file path=ppt/notesSlides/notesSlide1.xml><?xml version="1.0" encoding="utf-8"?>
+<p:notes xmlns:a="http://schemas.openxmlformats.org/drawingml/2006/main" xmlns:r="http://schemas.openxmlformats.org/officeDocument/2006/relationships" xmlns:p="http://schemas.openxmlformats.org/presentationml/2006/main">
+  <p:cSld>
+    <p:spTree>
+      <p:nvGrpSpPr>
+        <p:cNvPr id="1" name=""/>
+        <p:cNvGrpSpPr/>
+        <p:nvPr/>
+      </p:nvGrpSpPr>
+      <p:grpSpPr>
+        <a:xfrm>
+          <a:off x="0" y="0"/>
+          <a:ext cx="0" cy="0"/>
+          <a:chOff x="0" y="0"/>
+          <a:chExt cx="0" cy="0"/>
+        </a:xfrm>
+      </p:grpSpPr>
+      <p:sp>
+        <p:nvSpPr>
+          <p:cNvPr id="2" name="Slide Image Placeholder 1"/>
+          <p:cNvSpPr>
+            <a:spLocks noGrp="1" noRot="1" noChangeAspect="1"/>
+          </p:cNvSpPr>
+          <p:nvPr>
+            <p:ph type="sldImg"/>
+          </p:nvPr>
+        </p:nvSpPr>
+        <p:spPr/>
+      </p:sp>
+      <p:sp>
+        <p:nvSpPr>
+          <p:cNvPr id="3" name="Notes Placeholder 2"/>
+          <p:cNvSpPr>
+            <a:spLocks noGrp="1"/>
+          </p:cNvSpPr>
+          <p:nvPr>
+            <p:ph type="body" idx="1"/>
+          </p:nvPr>
+        </p:nvSpPr>
+        <p:spPr/>
+        <p:txBody>
+          <a:bodyPr/>
+          <a:lstStyle/>
+          <a:p>
+            <a:endParaRPr lang="en-GB" dirty="0"/>
+          </a:p>
+        </p:txBody>
+      </p:sp>
+      <p:sp>
+        <p:nvSpPr>
+          <p:cNvPr id="4" name="Slide Number Placeholder 3"/>
+          <p:cNvSpPr>
+            <a:spLocks noGrp="1"/>
+          </p:cNvSpPr>
+          <p:nvPr>
+            <p:ph type="sldNum" sz="quarter" idx="5"/>
+          </p:nvPr>
+        </p:nvSpPr>
+        <p:spPr/>
+        <p:txBody>
+          <a:bodyPr/>
+          <a:lstStyle/>
+          <a:p>
+            <a:fld id="{D34E1024-1B4F-464D-BD88-F1D57E23A3C1}" type="slidenum">
+              <a:rPr lang="en-GB" smtClean="0"/>
+              <a:t>11</a:t>
+            </a:fld>
+            <a:endParaRPr lang="en-GB"/>
+          </a:p>
+        </p:txBody>
+      </p:sp>
+    </p:spTree>
+    <p:extLst>
+      <p:ext uri="{BB962C8B-B14F-4D97-AF65-F5344CB8AC3E}">
+        <p14:creationId xmlns:p14="http://schemas.microsoft.com/office/powerpoint/2010/main" val="711576160"/>
+      </p:ext>
+    </p:extLst>
+  </p:cSld>
+  <p:clrMapOvr>
+    <a:masterClrMapping/>
+  </p:clrMapOvr>
+</p:notes>
+</file>
+
+<file path=ppt/notesSlides/notesSlide2.xml><?xml version="1.0" encoding="utf-8"?>
+<p:notes xmlns:a="http://schemas.openxmlformats.org/drawingml/2006/main" xmlns:r="http://schemas.openxmlformats.org/officeDocument/2006/relationships" xmlns:p="http://schemas.openxmlformats.org/presentationml/2006/main">
+  <p:cSld>
+    <p:spTree>
+      <p:nvGrpSpPr>
+        <p:cNvPr id="1" name=""/>
+        <p:cNvGrpSpPr/>
+        <p:nvPr/>
+      </p:nvGrpSpPr>
+      <p:grpSpPr>
+        <a:xfrm>
+          <a:off x="0" y="0"/>
+          <a:ext cx="0" cy="0"/>
+          <a:chOff x="0" y="0"/>
+          <a:chExt cx="0" cy="0"/>
+        </a:xfrm>
+      </p:grpSpPr>
+      <p:sp>
+        <p:nvSpPr>
+          <p:cNvPr id="2" name="Slide Image Placeholder 1"/>
+          <p:cNvSpPr>
+            <a:spLocks noGrp="1" noRot="1" noChangeAspect="1"/>
+          </p:cNvSpPr>
+          <p:nvPr>
+            <p:ph type="sldImg"/>
+          </p:nvPr>
+        </p:nvSpPr>
+        <p:spPr/>
+      </p:sp>
+      <p:sp>
+        <p:nvSpPr>
+          <p:cNvPr id="3" name="Notes Placeholder 2"/>
+          <p:cNvSpPr>
+            <a:spLocks noGrp="1"/>
+          </p:cNvSpPr>
+          <p:nvPr>
+            <p:ph type="body" idx="1"/>
+          </p:nvPr>
+        </p:nvSpPr>
+        <p:spPr/>
+        <p:txBody>
+          <a:bodyPr/>
+          <a:lstStyle/>
+          <a:p>
+            <a:endParaRPr lang="en-GB" dirty="0"/>
+          </a:p>
+        </p:txBody>
+      </p:sp>
+      <p:sp>
+        <p:nvSpPr>
+          <p:cNvPr id="4" name="Slide Number Placeholder 3"/>
+          <p:cNvSpPr>
+            <a:spLocks noGrp="1"/>
+          </p:cNvSpPr>
+          <p:nvPr>
+            <p:ph type="sldNum" sz="quarter" idx="5"/>
+          </p:nvPr>
+        </p:nvSpPr>
+        <p:spPr/>
+        <p:txBody>
+          <a:bodyPr/>
+          <a:lstStyle/>
+          <a:p>
+            <a:fld id="{D34E1024-1B4F-464D-BD88-F1D57E23A3C1}" type="slidenum">
+              <a:rPr lang="en-GB" smtClean="0"/>
+              <a:t>12</a:t>
+            </a:fld>
+            <a:endParaRPr lang="en-GB"/>
+          </a:p>
+        </p:txBody>
+      </p:sp>
+    </p:spTree>
+    <p:extLst>
+      <p:ext uri="{BB962C8B-B14F-4D97-AF65-F5344CB8AC3E}">
+        <p14:creationId xmlns:p14="http://schemas.microsoft.com/office/powerpoint/2010/main" val="1913314244"/>
+      </p:ext>
+    </p:extLst>
+  </p:cSld>
+  <p:clrMapOvr>
+    <a:masterClrMapping/>
+  </p:clrMapOvr>
+</p:notes>
+</file>
+
+<file path=ppt/notesSlides/notesSlide3.xml><?xml version="1.0" encoding="utf-8"?>
+<p:notes xmlns:a="http://schemas.openxmlformats.org/drawingml/2006/main" xmlns:r="http://schemas.openxmlformats.org/officeDocument/2006/relationships" xmlns:p="http://schemas.openxmlformats.org/presentationml/2006/main">
+  <p:cSld>
+    <p:spTree>
+      <p:nvGrpSpPr>
+        <p:cNvPr id="1" name=""/>
+        <p:cNvGrpSpPr/>
+        <p:nvPr/>
+      </p:nvGrpSpPr>
+      <p:grpSpPr>
+        <a:xfrm>
+          <a:off x="0" y="0"/>
+          <a:ext cx="0" cy="0"/>
+          <a:chOff x="0" y="0"/>
+          <a:chExt cx="0" cy="0"/>
+        </a:xfrm>
+      </p:grpSpPr>
+      <p:sp>
+        <p:nvSpPr>
+          <p:cNvPr id="2" name="Slide Image Placeholder 1"/>
+          <p:cNvSpPr>
+            <a:spLocks noGrp="1" noRot="1" noChangeAspect="1"/>
+          </p:cNvSpPr>
+          <p:nvPr>
+            <p:ph type="sldImg"/>
+          </p:nvPr>
+        </p:nvSpPr>
+        <p:spPr/>
+      </p:sp>
+      <p:sp>
+        <p:nvSpPr>
+          <p:cNvPr id="3" name="Notes Placeholder 2"/>
+          <p:cNvSpPr>
+            <a:spLocks noGrp="1"/>
+          </p:cNvSpPr>
+          <p:nvPr>
+            <p:ph type="body" idx="1"/>
+          </p:nvPr>
+        </p:nvSpPr>
+        <p:spPr/>
+        <p:txBody>
+          <a:bodyPr/>
+          <a:lstStyle/>
+          <a:p>
+            <a:endParaRPr lang="en-GB" dirty="0"/>
+          </a:p>
+        </p:txBody>
+      </p:sp>
+      <p:sp>
+        <p:nvSpPr>
+          <p:cNvPr id="4" name="Slide Number Placeholder 3"/>
+          <p:cNvSpPr>
+            <a:spLocks noGrp="1"/>
+          </p:cNvSpPr>
+          <p:nvPr>
+            <p:ph type="sldNum" sz="quarter" idx="5"/>
+          </p:nvPr>
+        </p:nvSpPr>
+        <p:spPr/>
+        <p:txBody>
+          <a:bodyPr/>
+          <a:lstStyle/>
+          <a:p>
+            <a:fld id="{D34E1024-1B4F-464D-BD88-F1D57E23A3C1}" type="slidenum">
+              <a:rPr lang="en-GB" smtClean="0"/>
+              <a:t>13</a:t>
+            </a:fld>
+            <a:endParaRPr lang="en-GB"/>
+          </a:p>
+        </p:txBody>
+      </p:sp>
+    </p:spTree>
+    <p:extLst>
+      <p:ext uri="{BB962C8B-B14F-4D97-AF65-F5344CB8AC3E}">
+        <p14:creationId xmlns:p14="http://schemas.microsoft.com/office/powerpoint/2010/main" val="3733377992"/>
+      </p:ext>
+    </p:extLst>
+  </p:cSld>
+  <p:clrMapOvr>
+    <a:masterClrMapping/>
+  </p:clrMapOvr>
+</p:notes>
+</file>
+
 <file path=ppt/slideLayouts/slideLayout1.xml><?xml version="1.0" encoding="utf-8"?>
 <p:sldLayout xmlns:a="http://schemas.openxmlformats.org/drawingml/2006/main" xmlns:r="http://schemas.openxmlformats.org/officeDocument/2006/relationships" xmlns:p="http://schemas.openxmlformats.org/presentationml/2006/main" showMasterSp="0" type="title" preserve="1">
   <p:cSld name="Title Slide">
@@ -271,7 +882,7 @@
           <a:p>
             <a:fld id="{0B00F558-DC57-46A4-828D-5403F2B88C83}" type="datetimeFigureOut">
               <a:rPr lang="en-GB" smtClean="0"/>
-              <a:t>06/07/2022</a:t>
+              <a:t>07/07/2022</a:t>
             </a:fld>
             <a:endParaRPr lang="en-GB"/>
           </a:p>
@@ -514,7 +1125,7 @@
           <a:p>
             <a:fld id="{0B00F558-DC57-46A4-828D-5403F2B88C83}" type="datetimeFigureOut">
               <a:rPr lang="en-GB" smtClean="0"/>
-              <a:t>06/07/2022</a:t>
+              <a:t>07/07/2022</a:t>
             </a:fld>
             <a:endParaRPr lang="en-GB"/>
           </a:p>
@@ -694,7 +1305,7 @@
           <a:p>
             <a:fld id="{0B00F558-DC57-46A4-828D-5403F2B88C83}" type="datetimeFigureOut">
               <a:rPr lang="en-GB" smtClean="0"/>
-              <a:t>06/07/2022</a:t>
+              <a:t>07/07/2022</a:t>
             </a:fld>
             <a:endParaRPr lang="en-GB"/>
           </a:p>
@@ -899,7 +1510,7 @@
           <a:p>
             <a:fld id="{0B00F558-DC57-46A4-828D-5403F2B88C83}" type="datetimeFigureOut">
               <a:rPr lang="en-GB" smtClean="0"/>
-              <a:t>06/07/2022</a:t>
+              <a:t>07/07/2022</a:t>
             </a:fld>
             <a:endParaRPr lang="en-GB"/>
           </a:p>
@@ -1156,7 +1767,7 @@
           <a:p>
             <a:fld id="{0B00F558-DC57-46A4-828D-5403F2B88C83}" type="datetimeFigureOut">
               <a:rPr lang="en-GB" smtClean="0"/>
-              <a:t>06/07/2022</a:t>
+              <a:t>07/07/2022</a:t>
             </a:fld>
             <a:endParaRPr lang="en-GB"/>
           </a:p>
@@ -1503,7 +2114,7 @@
           <a:p>
             <a:fld id="{0B00F558-DC57-46A4-828D-5403F2B88C83}" type="datetimeFigureOut">
               <a:rPr lang="en-GB" smtClean="0"/>
-              <a:t>06/07/2022</a:t>
+              <a:t>07/07/2022</a:t>
             </a:fld>
             <a:endParaRPr lang="en-GB"/>
           </a:p>
@@ -1905,7 +2516,7 @@
           <a:p>
             <a:fld id="{0B00F558-DC57-46A4-828D-5403F2B88C83}" type="datetimeFigureOut">
               <a:rPr lang="en-GB" smtClean="0"/>
-              <a:t>06/07/2022</a:t>
+              <a:t>07/07/2022</a:t>
             </a:fld>
             <a:endParaRPr lang="en-GB"/>
           </a:p>
@@ -2023,7 +2634,7 @@
           <a:p>
             <a:fld id="{0B00F558-DC57-46A4-828D-5403F2B88C83}" type="datetimeFigureOut">
               <a:rPr lang="en-GB" smtClean="0"/>
-              <a:t>06/07/2022</a:t>
+              <a:t>07/07/2022</a:t>
             </a:fld>
             <a:endParaRPr lang="en-GB"/>
           </a:p>
@@ -2118,7 +2729,7 @@
           <a:p>
             <a:fld id="{0B00F558-DC57-46A4-828D-5403F2B88C83}" type="datetimeFigureOut">
               <a:rPr lang="en-GB" smtClean="0"/>
-              <a:t>06/07/2022</a:t>
+              <a:t>07/07/2022</a:t>
             </a:fld>
             <a:endParaRPr lang="en-GB"/>
           </a:p>
@@ -2408,7 +3019,7 @@
           <a:p>
             <a:fld id="{0B00F558-DC57-46A4-828D-5403F2B88C83}" type="datetimeFigureOut">
               <a:rPr lang="en-GB" smtClean="0"/>
-              <a:t>06/07/2022</a:t>
+              <a:t>07/07/2022</a:t>
             </a:fld>
             <a:endParaRPr lang="en-GB"/>
           </a:p>
@@ -2688,7 +3299,7 @@
           <a:p>
             <a:fld id="{0B00F558-DC57-46A4-828D-5403F2B88C83}" type="datetimeFigureOut">
               <a:rPr lang="en-GB" smtClean="0"/>
-              <a:t>06/07/2022</a:t>
+              <a:t>07/07/2022</a:t>
             </a:fld>
             <a:endParaRPr lang="en-GB"/>
           </a:p>
@@ -2938,7 +3549,7 @@
           <a:p>
             <a:fld id="{0B00F558-DC57-46A4-828D-5403F2B88C83}" type="datetimeFigureOut">
               <a:rPr lang="en-GB" smtClean="0"/>
-              <a:t>06/07/2022</a:t>
+              <a:t>07/07/2022</a:t>
             </a:fld>
             <a:endParaRPr lang="en-GB"/>
           </a:p>
@@ -3523,6 +4134,2266 @@
 </p:sld>
 </file>
 
+<file path=ppt/slides/slide10.xml><?xml version="1.0" encoding="utf-8"?>
+<p:sld xmlns:a="http://schemas.openxmlformats.org/drawingml/2006/main" xmlns:r="http://schemas.openxmlformats.org/officeDocument/2006/relationships" xmlns:p="http://schemas.openxmlformats.org/presentationml/2006/main">
+  <p:cSld>
+    <p:spTree>
+      <p:nvGrpSpPr>
+        <p:cNvPr id="1" name=""/>
+        <p:cNvGrpSpPr/>
+        <p:nvPr/>
+      </p:nvGrpSpPr>
+      <p:grpSpPr>
+        <a:xfrm>
+          <a:off x="0" y="0"/>
+          <a:ext cx="0" cy="0"/>
+          <a:chOff x="0" y="0"/>
+          <a:chExt cx="0" cy="0"/>
+        </a:xfrm>
+      </p:grpSpPr>
+      <p:pic>
+        <p:nvPicPr>
+          <p:cNvPr id="18" name="Picture 17">
+            <a:extLst>
+              <a:ext uri="{FF2B5EF4-FFF2-40B4-BE49-F238E27FC236}">
+                <a16:creationId xmlns:a16="http://schemas.microsoft.com/office/drawing/2014/main" id="{4A79E959-AD9B-FA47-0DBB-BC37110FF4D6}"/>
+              </a:ext>
+            </a:extLst>
+          </p:cNvPr>
+          <p:cNvPicPr>
+            <a:picLocks noChangeAspect="1"/>
+          </p:cNvPicPr>
+          <p:nvPr/>
+        </p:nvPicPr>
+        <p:blipFill>
+          <a:blip r:embed="rId2"/>
+          <a:stretch>
+            <a:fillRect/>
+          </a:stretch>
+        </p:blipFill>
+        <p:spPr>
+          <a:xfrm>
+            <a:off x="476223" y="3301516"/>
+            <a:ext cx="11239551" cy="1216595"/>
+          </a:xfrm>
+          <a:prstGeom prst="rect">
+            <a:avLst/>
+          </a:prstGeom>
+        </p:spPr>
+      </p:pic>
+      <p:sp>
+        <p:nvSpPr>
+          <p:cNvPr id="2" name="Title 1">
+            <a:extLst>
+              <a:ext uri="{FF2B5EF4-FFF2-40B4-BE49-F238E27FC236}">
+                <a16:creationId xmlns:a16="http://schemas.microsoft.com/office/drawing/2014/main" id="{518D9A5E-D95D-E081-C9C5-858975DD73C6}"/>
+              </a:ext>
+            </a:extLst>
+          </p:cNvPr>
+          <p:cNvSpPr>
+            <a:spLocks noGrp="1"/>
+          </p:cNvSpPr>
+          <p:nvPr>
+            <p:ph type="title"/>
+          </p:nvPr>
+        </p:nvSpPr>
+        <p:spPr/>
+        <p:txBody>
+          <a:bodyPr/>
+          <a:lstStyle/>
+          <a:p>
+            <a:r>
+              <a:rPr lang="en-GB" dirty="0"/>
+              <a:t>Triangles in Pandas</a:t>
+            </a:r>
+          </a:p>
+        </p:txBody>
+      </p:sp>
+      <p:cxnSp>
+        <p:nvCxnSpPr>
+          <p:cNvPr id="7" name="Straight Arrow Connector 6">
+            <a:extLst>
+              <a:ext uri="{FF2B5EF4-FFF2-40B4-BE49-F238E27FC236}">
+                <a16:creationId xmlns:a16="http://schemas.microsoft.com/office/drawing/2014/main" id="{B73766E3-9170-EB57-440A-530A5390525D}"/>
+              </a:ext>
+            </a:extLst>
+          </p:cNvPr>
+          <p:cNvCxnSpPr>
+            <a:cxnSpLocks/>
+          </p:cNvCxnSpPr>
+          <p:nvPr/>
+        </p:nvCxnSpPr>
+        <p:spPr>
+          <a:xfrm>
+            <a:off x="2916936" y="2644199"/>
+            <a:ext cx="0" cy="769298"/>
+          </a:xfrm>
+          <a:prstGeom prst="straightConnector1">
+            <a:avLst/>
+          </a:prstGeom>
+          <a:ln w="76200">
+            <a:solidFill>
+              <a:srgbClr val="9CBEBD"/>
+            </a:solidFill>
+            <a:tailEnd type="triangle"/>
+          </a:ln>
+        </p:spPr>
+        <p:style>
+          <a:lnRef idx="1">
+            <a:schemeClr val="accent1"/>
+          </a:lnRef>
+          <a:fillRef idx="0">
+            <a:schemeClr val="accent1"/>
+          </a:fillRef>
+          <a:effectRef idx="0">
+            <a:schemeClr val="accent1"/>
+          </a:effectRef>
+          <a:fontRef idx="minor">
+            <a:schemeClr val="tx1"/>
+          </a:fontRef>
+        </p:style>
+      </p:cxnSp>
+      <p:sp>
+        <p:nvSpPr>
+          <p:cNvPr id="15" name="TextBox 14">
+            <a:extLst>
+              <a:ext uri="{FF2B5EF4-FFF2-40B4-BE49-F238E27FC236}">
+                <a16:creationId xmlns:a16="http://schemas.microsoft.com/office/drawing/2014/main" id="{08E990F7-8893-4291-9D12-5D71EACFEC4E}"/>
+              </a:ext>
+            </a:extLst>
+          </p:cNvPr>
+          <p:cNvSpPr txBox="1"/>
+          <p:nvPr/>
+        </p:nvSpPr>
+        <p:spPr>
+          <a:xfrm>
+            <a:off x="2878932" y="2341667"/>
+            <a:ext cx="3931443" cy="400110"/>
+          </a:xfrm>
+          <a:prstGeom prst="rect">
+            <a:avLst/>
+          </a:prstGeom>
+          <a:solidFill>
+            <a:srgbClr val="9CBEBD"/>
+          </a:solidFill>
+        </p:spPr>
+        <p:txBody>
+          <a:bodyPr wrap="square" rtlCol="0">
+            <a:spAutoFit/>
+          </a:bodyPr>
+          <a:lstStyle/>
+          <a:p>
+            <a:r>
+              <a:rPr lang="en-GB" sz="2000" dirty="0">
+                <a:effectLst/>
+                <a:ea typeface="Calibri" panose="020F0502020204030204" pitchFamily="34" charset="0"/>
+                <a:cs typeface="Courier New" panose="02070309020205020404" pitchFamily="49" charset="0"/>
+              </a:rPr>
+              <a:t>Built-in function to create pivot tables</a:t>
+            </a:r>
+          </a:p>
+        </p:txBody>
+      </p:sp>
+    </p:spTree>
+    <p:extLst>
+      <p:ext uri="{BB962C8B-B14F-4D97-AF65-F5344CB8AC3E}">
+        <p14:creationId xmlns:p14="http://schemas.microsoft.com/office/powerpoint/2010/main" val="1959842838"/>
+      </p:ext>
+    </p:extLst>
+  </p:cSld>
+  <p:clrMapOvr>
+    <a:masterClrMapping/>
+  </p:clrMapOvr>
+</p:sld>
+</file>
+
+<file path=ppt/slides/slide11.xml><?xml version="1.0" encoding="utf-8"?>
+<p:sld xmlns:a="http://schemas.openxmlformats.org/drawingml/2006/main" xmlns:r="http://schemas.openxmlformats.org/officeDocument/2006/relationships" xmlns:p="http://schemas.openxmlformats.org/presentationml/2006/main">
+  <p:cSld>
+    <p:spTree>
+      <p:nvGrpSpPr>
+        <p:cNvPr id="1" name=""/>
+        <p:cNvGrpSpPr/>
+        <p:nvPr/>
+      </p:nvGrpSpPr>
+      <p:grpSpPr>
+        <a:xfrm>
+          <a:off x="0" y="0"/>
+          <a:ext cx="0" cy="0"/>
+          <a:chOff x="0" y="0"/>
+          <a:chExt cx="0" cy="0"/>
+        </a:xfrm>
+      </p:grpSpPr>
+      <p:pic>
+        <p:nvPicPr>
+          <p:cNvPr id="58" name="Picture 57">
+            <a:extLst>
+              <a:ext uri="{FF2B5EF4-FFF2-40B4-BE49-F238E27FC236}">
+                <a16:creationId xmlns:a16="http://schemas.microsoft.com/office/drawing/2014/main" id="{FD05B0A2-EC94-319F-18E0-0AE3CC9E08C1}"/>
+              </a:ext>
+            </a:extLst>
+          </p:cNvPr>
+          <p:cNvPicPr>
+            <a:picLocks noChangeAspect="1"/>
+          </p:cNvPicPr>
+          <p:nvPr/>
+        </p:nvPicPr>
+        <p:blipFill>
+          <a:blip r:embed="rId3"/>
+          <a:stretch>
+            <a:fillRect/>
+          </a:stretch>
+        </p:blipFill>
+        <p:spPr>
+          <a:xfrm>
+            <a:off x="476223" y="3305678"/>
+            <a:ext cx="11239539" cy="1209970"/>
+          </a:xfrm>
+          <a:prstGeom prst="rect">
+            <a:avLst/>
+          </a:prstGeom>
+        </p:spPr>
+      </p:pic>
+      <p:sp>
+        <p:nvSpPr>
+          <p:cNvPr id="2" name="Title 1">
+            <a:extLst>
+              <a:ext uri="{FF2B5EF4-FFF2-40B4-BE49-F238E27FC236}">
+                <a16:creationId xmlns:a16="http://schemas.microsoft.com/office/drawing/2014/main" id="{518D9A5E-D95D-E081-C9C5-858975DD73C6}"/>
+              </a:ext>
+            </a:extLst>
+          </p:cNvPr>
+          <p:cNvSpPr>
+            <a:spLocks noGrp="1"/>
+          </p:cNvSpPr>
+          <p:nvPr>
+            <p:ph type="title"/>
+          </p:nvPr>
+        </p:nvSpPr>
+        <p:spPr/>
+        <p:txBody>
+          <a:bodyPr/>
+          <a:lstStyle/>
+          <a:p>
+            <a:r>
+              <a:rPr lang="en-GB" dirty="0"/>
+              <a:t>Triangles in Pandas</a:t>
+            </a:r>
+          </a:p>
+        </p:txBody>
+      </p:sp>
+      <p:grpSp>
+        <p:nvGrpSpPr>
+          <p:cNvPr id="113" name="Group 112">
+            <a:extLst>
+              <a:ext uri="{FF2B5EF4-FFF2-40B4-BE49-F238E27FC236}">
+                <a16:creationId xmlns:a16="http://schemas.microsoft.com/office/drawing/2014/main" id="{9237775A-5A31-424A-3ABA-E7E62C9930B7}"/>
+              </a:ext>
+            </a:extLst>
+          </p:cNvPr>
+          <p:cNvGrpSpPr/>
+          <p:nvPr/>
+        </p:nvGrpSpPr>
+        <p:grpSpPr>
+          <a:xfrm>
+            <a:off x="3733324" y="1594395"/>
+            <a:ext cx="5217001" cy="1824286"/>
+            <a:chOff x="3733324" y="1594395"/>
+            <a:chExt cx="5217001" cy="1824286"/>
+          </a:xfrm>
+        </p:grpSpPr>
+        <p:cxnSp>
+          <p:nvCxnSpPr>
+            <p:cNvPr id="7" name="Straight Arrow Connector 6">
+              <a:extLst>
+                <a:ext uri="{FF2B5EF4-FFF2-40B4-BE49-F238E27FC236}">
+                  <a16:creationId xmlns:a16="http://schemas.microsoft.com/office/drawing/2014/main" id="{B73766E3-9170-EB57-440A-530A5390525D}"/>
+                </a:ext>
+              </a:extLst>
+            </p:cNvPr>
+            <p:cNvCxnSpPr>
+              <a:cxnSpLocks/>
+            </p:cNvCxnSpPr>
+            <p:nvPr/>
+          </p:nvCxnSpPr>
+          <p:spPr>
+            <a:xfrm>
+              <a:off x="3769724" y="1866900"/>
+              <a:ext cx="0" cy="1551781"/>
+            </a:xfrm>
+            <a:prstGeom prst="straightConnector1">
+              <a:avLst/>
+            </a:prstGeom>
+            <a:ln w="76200">
+              <a:solidFill>
+                <a:srgbClr val="9CBEBD"/>
+              </a:solidFill>
+              <a:tailEnd type="triangle"/>
+            </a:ln>
+          </p:spPr>
+          <p:style>
+            <a:lnRef idx="1">
+              <a:schemeClr val="accent1"/>
+            </a:lnRef>
+            <a:fillRef idx="0">
+              <a:schemeClr val="accent1"/>
+            </a:fillRef>
+            <a:effectRef idx="0">
+              <a:schemeClr val="accent1"/>
+            </a:effectRef>
+            <a:fontRef idx="minor">
+              <a:schemeClr val="tx1"/>
+            </a:fontRef>
+          </p:style>
+        </p:cxnSp>
+        <p:sp>
+          <p:nvSpPr>
+            <p:cNvPr id="15" name="TextBox 14">
+              <a:extLst>
+                <a:ext uri="{FF2B5EF4-FFF2-40B4-BE49-F238E27FC236}">
+                  <a16:creationId xmlns:a16="http://schemas.microsoft.com/office/drawing/2014/main" id="{08E990F7-8893-4291-9D12-5D71EACFEC4E}"/>
+                </a:ext>
+              </a:extLst>
+            </p:cNvPr>
+            <p:cNvSpPr txBox="1"/>
+            <p:nvPr/>
+          </p:nvSpPr>
+          <p:spPr>
+            <a:xfrm>
+              <a:off x="3733324" y="1594395"/>
+              <a:ext cx="5217001" cy="400110"/>
+            </a:xfrm>
+            <a:prstGeom prst="rect">
+              <a:avLst/>
+            </a:prstGeom>
+            <a:solidFill>
+              <a:srgbClr val="9CBEBD"/>
+            </a:solidFill>
+          </p:spPr>
+          <p:txBody>
+            <a:bodyPr wrap="square" rtlCol="0">
+              <a:spAutoFit/>
+            </a:bodyPr>
+            <a:lstStyle/>
+            <a:p>
+              <a:r>
+                <a:rPr lang="en-GB" sz="2000" dirty="0">
+                  <a:effectLst/>
+                  <a:ea typeface="Calibri" panose="020F0502020204030204" pitchFamily="34" charset="0"/>
+                  <a:cs typeface="Courier New" panose="02070309020205020404" pitchFamily="49" charset="0"/>
+                </a:rPr>
+                <a:t>The name of the DataFrame to retrieve data from</a:t>
+              </a:r>
+            </a:p>
+          </p:txBody>
+        </p:sp>
+      </p:grpSp>
+      <p:grpSp>
+        <p:nvGrpSpPr>
+          <p:cNvPr id="112" name="Group 111">
+            <a:extLst>
+              <a:ext uri="{FF2B5EF4-FFF2-40B4-BE49-F238E27FC236}">
+                <a16:creationId xmlns:a16="http://schemas.microsoft.com/office/drawing/2014/main" id="{A09829AF-CBC2-75E6-F6EA-8674F88C6D0E}"/>
+              </a:ext>
+            </a:extLst>
+          </p:cNvPr>
+          <p:cNvGrpSpPr/>
+          <p:nvPr/>
+        </p:nvGrpSpPr>
+        <p:grpSpPr>
+          <a:xfrm>
+            <a:off x="5517498" y="2097532"/>
+            <a:ext cx="4436127" cy="1321149"/>
+            <a:chOff x="5517498" y="2097532"/>
+            <a:chExt cx="4436127" cy="1321149"/>
+          </a:xfrm>
+        </p:grpSpPr>
+        <p:cxnSp>
+          <p:nvCxnSpPr>
+            <p:cNvPr id="10" name="Straight Arrow Connector 9">
+              <a:extLst>
+                <a:ext uri="{FF2B5EF4-FFF2-40B4-BE49-F238E27FC236}">
+                  <a16:creationId xmlns:a16="http://schemas.microsoft.com/office/drawing/2014/main" id="{1133582A-0440-C18D-7C25-D4B13E6EF022}"/>
+                </a:ext>
+              </a:extLst>
+            </p:cNvPr>
+            <p:cNvCxnSpPr>
+              <a:cxnSpLocks/>
+            </p:cNvCxnSpPr>
+            <p:nvPr/>
+          </p:nvCxnSpPr>
+          <p:spPr>
+            <a:xfrm>
+              <a:off x="5549930" y="2155825"/>
+              <a:ext cx="0" cy="1262856"/>
+            </a:xfrm>
+            <a:prstGeom prst="straightConnector1">
+              <a:avLst/>
+            </a:prstGeom>
+            <a:ln w="76200">
+              <a:solidFill>
+                <a:srgbClr val="77A5A4"/>
+              </a:solidFill>
+              <a:tailEnd type="triangle"/>
+            </a:ln>
+          </p:spPr>
+          <p:style>
+            <a:lnRef idx="1">
+              <a:schemeClr val="accent1"/>
+            </a:lnRef>
+            <a:fillRef idx="0">
+              <a:schemeClr val="accent1"/>
+            </a:fillRef>
+            <a:effectRef idx="0">
+              <a:schemeClr val="accent1"/>
+            </a:effectRef>
+            <a:fontRef idx="minor">
+              <a:schemeClr val="tx1"/>
+            </a:fontRef>
+          </p:style>
+        </p:cxnSp>
+        <p:sp>
+          <p:nvSpPr>
+            <p:cNvPr id="11" name="TextBox 10">
+              <a:extLst>
+                <a:ext uri="{FF2B5EF4-FFF2-40B4-BE49-F238E27FC236}">
+                  <a16:creationId xmlns:a16="http://schemas.microsoft.com/office/drawing/2014/main" id="{5B082AD0-4653-53E1-B726-7BC7625CA956}"/>
+                </a:ext>
+              </a:extLst>
+            </p:cNvPr>
+            <p:cNvSpPr txBox="1"/>
+            <p:nvPr/>
+          </p:nvSpPr>
+          <p:spPr>
+            <a:xfrm>
+              <a:off x="5517498" y="2097532"/>
+              <a:ext cx="4436127" cy="400110"/>
+            </a:xfrm>
+            <a:prstGeom prst="rect">
+              <a:avLst/>
+            </a:prstGeom>
+            <a:solidFill>
+              <a:srgbClr val="77A5A4"/>
+            </a:solidFill>
+            <a:ln>
+              <a:solidFill>
+                <a:srgbClr val="77A5A4"/>
+              </a:solidFill>
+            </a:ln>
+          </p:spPr>
+          <p:txBody>
+            <a:bodyPr wrap="square" rtlCol="0">
+              <a:spAutoFit/>
+            </a:bodyPr>
+            <a:lstStyle/>
+            <a:p>
+              <a:r>
+                <a:rPr lang="en-GB" sz="2000" dirty="0">
+                  <a:effectLst/>
+                  <a:ea typeface="Calibri" panose="020F0502020204030204" pitchFamily="34" charset="0"/>
+                  <a:cs typeface="Courier New" panose="02070309020205020404" pitchFamily="49" charset="0"/>
+                </a:rPr>
+                <a:t>The name of th</a:t>
+              </a:r>
+              <a:r>
+                <a:rPr lang="en-GB" sz="2000" dirty="0">
+                  <a:ea typeface="Calibri" panose="020F0502020204030204" pitchFamily="34" charset="0"/>
+                  <a:cs typeface="Courier New" panose="02070309020205020404" pitchFamily="49" charset="0"/>
+                </a:rPr>
+                <a:t>e column to show values for</a:t>
+              </a:r>
+              <a:endParaRPr lang="en-GB" sz="2000" dirty="0">
+                <a:effectLst/>
+                <a:ea typeface="Calibri" panose="020F0502020204030204" pitchFamily="34" charset="0"/>
+                <a:cs typeface="Courier New" panose="02070309020205020404" pitchFamily="49" charset="0"/>
+              </a:endParaRPr>
+            </a:p>
+          </p:txBody>
+        </p:sp>
+      </p:grpSp>
+      <p:grpSp>
+        <p:nvGrpSpPr>
+          <p:cNvPr id="111" name="Group 110">
+            <a:extLst>
+              <a:ext uri="{FF2B5EF4-FFF2-40B4-BE49-F238E27FC236}">
+                <a16:creationId xmlns:a16="http://schemas.microsoft.com/office/drawing/2014/main" id="{D7F2AABB-501D-23ED-FF3A-9407967117FE}"/>
+              </a:ext>
+            </a:extLst>
+          </p:cNvPr>
+          <p:cNvGrpSpPr/>
+          <p:nvPr/>
+        </p:nvGrpSpPr>
+        <p:grpSpPr>
+          <a:xfrm>
+            <a:off x="8377995" y="2610193"/>
+            <a:ext cx="2884334" cy="808488"/>
+            <a:chOff x="8377995" y="2610193"/>
+            <a:chExt cx="2884334" cy="808488"/>
+          </a:xfrm>
+        </p:grpSpPr>
+        <p:cxnSp>
+          <p:nvCxnSpPr>
+            <p:cNvPr id="20" name="Straight Arrow Connector 19">
+              <a:extLst>
+                <a:ext uri="{FF2B5EF4-FFF2-40B4-BE49-F238E27FC236}">
+                  <a16:creationId xmlns:a16="http://schemas.microsoft.com/office/drawing/2014/main" id="{8301FADE-0B9B-24A4-8C12-74EBFD48147C}"/>
+                </a:ext>
+              </a:extLst>
+            </p:cNvPr>
+            <p:cNvCxnSpPr>
+              <a:cxnSpLocks/>
+            </p:cNvCxnSpPr>
+            <p:nvPr/>
+          </p:nvCxnSpPr>
+          <p:spPr>
+            <a:xfrm>
+              <a:off x="8410517" y="2859618"/>
+              <a:ext cx="0" cy="559063"/>
+            </a:xfrm>
+            <a:prstGeom prst="straightConnector1">
+              <a:avLst/>
+            </a:prstGeom>
+            <a:ln w="76200">
+              <a:solidFill>
+                <a:srgbClr val="5D8D8C"/>
+              </a:solidFill>
+              <a:tailEnd type="triangle"/>
+            </a:ln>
+          </p:spPr>
+          <p:style>
+            <a:lnRef idx="1">
+              <a:schemeClr val="accent1"/>
+            </a:lnRef>
+            <a:fillRef idx="0">
+              <a:schemeClr val="accent1"/>
+            </a:fillRef>
+            <a:effectRef idx="0">
+              <a:schemeClr val="accent1"/>
+            </a:effectRef>
+            <a:fontRef idx="minor">
+              <a:schemeClr val="tx1"/>
+            </a:fontRef>
+          </p:style>
+        </p:cxnSp>
+        <p:sp>
+          <p:nvSpPr>
+            <p:cNvPr id="21" name="TextBox 20">
+              <a:extLst>
+                <a:ext uri="{FF2B5EF4-FFF2-40B4-BE49-F238E27FC236}">
+                  <a16:creationId xmlns:a16="http://schemas.microsoft.com/office/drawing/2014/main" id="{3C9CE440-9B62-5047-18DD-7BD81DB2DF49}"/>
+                </a:ext>
+              </a:extLst>
+            </p:cNvPr>
+            <p:cNvSpPr txBox="1"/>
+            <p:nvPr/>
+          </p:nvSpPr>
+          <p:spPr>
+            <a:xfrm>
+              <a:off x="8377995" y="2610193"/>
+              <a:ext cx="2884334" cy="400110"/>
+            </a:xfrm>
+            <a:prstGeom prst="rect">
+              <a:avLst/>
+            </a:prstGeom>
+            <a:solidFill>
+              <a:srgbClr val="5D8D8C"/>
+            </a:solidFill>
+            <a:ln>
+              <a:solidFill>
+                <a:srgbClr val="5D8D8C"/>
+              </a:solidFill>
+            </a:ln>
+          </p:spPr>
+          <p:txBody>
+            <a:bodyPr wrap="square" rtlCol="0">
+              <a:spAutoFit/>
+            </a:bodyPr>
+            <a:lstStyle/>
+            <a:p>
+              <a:r>
+                <a:rPr lang="en-GB" sz="2000" dirty="0">
+                  <a:effectLst/>
+                  <a:ea typeface="Calibri" panose="020F0502020204030204" pitchFamily="34" charset="0"/>
+                  <a:cs typeface="Courier New" panose="02070309020205020404" pitchFamily="49" charset="0"/>
+                </a:rPr>
+                <a:t>The column to be the index</a:t>
+              </a:r>
+            </a:p>
+          </p:txBody>
+        </p:sp>
+      </p:grpSp>
+      <p:sp>
+        <p:nvSpPr>
+          <p:cNvPr id="31" name="TextBox 30">
+            <a:extLst>
+              <a:ext uri="{FF2B5EF4-FFF2-40B4-BE49-F238E27FC236}">
+                <a16:creationId xmlns:a16="http://schemas.microsoft.com/office/drawing/2014/main" id="{5BCF9C67-8BD2-DEA5-05E5-9923B61BC24C}"/>
+              </a:ext>
+            </a:extLst>
+          </p:cNvPr>
+          <p:cNvSpPr txBox="1"/>
+          <p:nvPr/>
+        </p:nvSpPr>
+        <p:spPr>
+          <a:xfrm>
+            <a:off x="2948284" y="5742896"/>
+            <a:ext cx="6843128" cy="400110"/>
+          </a:xfrm>
+          <a:prstGeom prst="rect">
+            <a:avLst/>
+          </a:prstGeom>
+          <a:solidFill>
+            <a:srgbClr val="9CBEBD"/>
+          </a:solidFill>
+        </p:spPr>
+        <p:txBody>
+          <a:bodyPr wrap="square" rtlCol="0">
+            <a:spAutoFit/>
+          </a:bodyPr>
+          <a:lstStyle/>
+          <a:p>
+            <a:r>
+              <a:rPr lang="en-GB" sz="2000" dirty="0">
+                <a:effectLst/>
+                <a:ea typeface="Calibri" panose="020F0502020204030204" pitchFamily="34" charset="0"/>
+                <a:cs typeface="Courier New" panose="02070309020205020404" pitchFamily="49" charset="0"/>
+              </a:rPr>
+              <a:t>The values in this column will be the columns in the new pivot table</a:t>
+            </a:r>
+          </a:p>
+        </p:txBody>
+      </p:sp>
+      <p:grpSp>
+        <p:nvGrpSpPr>
+          <p:cNvPr id="110" name="Group 109">
+            <a:extLst>
+              <a:ext uri="{FF2B5EF4-FFF2-40B4-BE49-F238E27FC236}">
+                <a16:creationId xmlns:a16="http://schemas.microsoft.com/office/drawing/2014/main" id="{021BF62C-FE17-2323-EC6C-C3F7CD113C5F}"/>
+              </a:ext>
+            </a:extLst>
+          </p:cNvPr>
+          <p:cNvGrpSpPr/>
+          <p:nvPr/>
+        </p:nvGrpSpPr>
+        <p:grpSpPr>
+          <a:xfrm>
+            <a:off x="5180520" y="4059998"/>
+            <a:ext cx="6544477" cy="1568435"/>
+            <a:chOff x="5180520" y="4059998"/>
+            <a:chExt cx="6544477" cy="1568435"/>
+          </a:xfrm>
+        </p:grpSpPr>
+        <p:cxnSp>
+          <p:nvCxnSpPr>
+            <p:cNvPr id="46" name="Straight Arrow Connector 45">
+              <a:extLst>
+                <a:ext uri="{FF2B5EF4-FFF2-40B4-BE49-F238E27FC236}">
+                  <a16:creationId xmlns:a16="http://schemas.microsoft.com/office/drawing/2014/main" id="{0B67AED9-EF3F-46B1-A346-D88D40CD4F54}"/>
+                </a:ext>
+              </a:extLst>
+            </p:cNvPr>
+            <p:cNvCxnSpPr>
+              <a:cxnSpLocks/>
+            </p:cNvCxnSpPr>
+            <p:nvPr/>
+          </p:nvCxnSpPr>
+          <p:spPr>
+            <a:xfrm flipV="1">
+              <a:off x="5213997" y="4059998"/>
+              <a:ext cx="0" cy="1427592"/>
+            </a:xfrm>
+            <a:prstGeom prst="straightConnector1">
+              <a:avLst/>
+            </a:prstGeom>
+            <a:ln w="76200">
+              <a:solidFill>
+                <a:srgbClr val="77A5A4"/>
+              </a:solidFill>
+              <a:tailEnd type="triangle"/>
+            </a:ln>
+          </p:spPr>
+          <p:style>
+            <a:lnRef idx="1">
+              <a:schemeClr val="accent1"/>
+            </a:lnRef>
+            <a:fillRef idx="0">
+              <a:schemeClr val="accent1"/>
+            </a:fillRef>
+            <a:effectRef idx="0">
+              <a:schemeClr val="accent1"/>
+            </a:effectRef>
+            <a:fontRef idx="minor">
+              <a:schemeClr val="tx1"/>
+            </a:fontRef>
+          </p:style>
+        </p:cxnSp>
+        <p:sp>
+          <p:nvSpPr>
+            <p:cNvPr id="47" name="TextBox 46">
+              <a:extLst>
+                <a:ext uri="{FF2B5EF4-FFF2-40B4-BE49-F238E27FC236}">
+                  <a16:creationId xmlns:a16="http://schemas.microsoft.com/office/drawing/2014/main" id="{3EF56BB0-5B51-75B1-F366-407DA8BAE96D}"/>
+                </a:ext>
+              </a:extLst>
+            </p:cNvPr>
+            <p:cNvSpPr txBox="1"/>
+            <p:nvPr/>
+          </p:nvSpPr>
+          <p:spPr>
+            <a:xfrm>
+              <a:off x="5180520" y="5228323"/>
+              <a:ext cx="6544477" cy="400110"/>
+            </a:xfrm>
+            <a:prstGeom prst="rect">
+              <a:avLst/>
+            </a:prstGeom>
+            <a:solidFill>
+              <a:srgbClr val="77A5A4"/>
+            </a:solidFill>
+            <a:ln>
+              <a:solidFill>
+                <a:srgbClr val="77A5A4"/>
+              </a:solidFill>
+            </a:ln>
+          </p:spPr>
+          <p:txBody>
+            <a:bodyPr wrap="square" rtlCol="0">
+              <a:spAutoFit/>
+            </a:bodyPr>
+            <a:lstStyle/>
+            <a:p>
+              <a:r>
+                <a:rPr lang="en-GB" sz="2000" dirty="0">
+                  <a:effectLst/>
+                  <a:ea typeface="Calibri" panose="020F0502020204030204" pitchFamily="34" charset="0"/>
+                  <a:cs typeface="Courier New" panose="02070309020205020404" pitchFamily="49" charset="0"/>
+                </a:rPr>
+                <a:t>Sums up values with the same key (means we can have a tota</a:t>
+              </a:r>
+              <a:r>
+                <a:rPr lang="en-GB" sz="2000" dirty="0">
+                  <a:ea typeface="Calibri" panose="020F0502020204030204" pitchFamily="34" charset="0"/>
+                  <a:cs typeface="Courier New" panose="02070309020205020404" pitchFamily="49" charset="0"/>
+                </a:rPr>
+                <a:t>l)</a:t>
+              </a:r>
+              <a:endParaRPr lang="en-GB" sz="2000" dirty="0">
+                <a:effectLst/>
+                <a:ea typeface="Calibri" panose="020F0502020204030204" pitchFamily="34" charset="0"/>
+                <a:cs typeface="Courier New" panose="02070309020205020404" pitchFamily="49" charset="0"/>
+              </a:endParaRPr>
+            </a:p>
+          </p:txBody>
+        </p:sp>
+      </p:grpSp>
+      <p:grpSp>
+        <p:nvGrpSpPr>
+          <p:cNvPr id="109" name="Group 108">
+            <a:extLst>
+              <a:ext uri="{FF2B5EF4-FFF2-40B4-BE49-F238E27FC236}">
+                <a16:creationId xmlns:a16="http://schemas.microsoft.com/office/drawing/2014/main" id="{3423F863-CEE1-5C38-6E2A-8E04B772317F}"/>
+              </a:ext>
+            </a:extLst>
+          </p:cNvPr>
+          <p:cNvGrpSpPr/>
+          <p:nvPr/>
+        </p:nvGrpSpPr>
+        <p:grpSpPr>
+          <a:xfrm>
+            <a:off x="6544142" y="3833432"/>
+            <a:ext cx="5176379" cy="1282032"/>
+            <a:chOff x="6544142" y="3833432"/>
+            <a:chExt cx="5176379" cy="1282032"/>
+          </a:xfrm>
+        </p:grpSpPr>
+        <p:cxnSp>
+          <p:nvCxnSpPr>
+            <p:cNvPr id="49" name="Straight Arrow Connector 48">
+              <a:extLst>
+                <a:ext uri="{FF2B5EF4-FFF2-40B4-BE49-F238E27FC236}">
+                  <a16:creationId xmlns:a16="http://schemas.microsoft.com/office/drawing/2014/main" id="{963FB811-8F98-E2B1-D877-A4579FD73910}"/>
+                </a:ext>
+              </a:extLst>
+            </p:cNvPr>
+            <p:cNvCxnSpPr>
+              <a:cxnSpLocks/>
+            </p:cNvCxnSpPr>
+            <p:nvPr/>
+          </p:nvCxnSpPr>
+          <p:spPr>
+            <a:xfrm flipV="1">
+              <a:off x="8994932" y="3833432"/>
+              <a:ext cx="0" cy="452818"/>
+            </a:xfrm>
+            <a:prstGeom prst="straightConnector1">
+              <a:avLst/>
+            </a:prstGeom>
+            <a:ln w="76200">
+              <a:solidFill>
+                <a:srgbClr val="5D8D8C"/>
+              </a:solidFill>
+              <a:tailEnd type="triangle"/>
+            </a:ln>
+          </p:spPr>
+          <p:style>
+            <a:lnRef idx="1">
+              <a:schemeClr val="accent1"/>
+            </a:lnRef>
+            <a:fillRef idx="0">
+              <a:schemeClr val="accent1"/>
+            </a:fillRef>
+            <a:effectRef idx="0">
+              <a:schemeClr val="accent1"/>
+            </a:effectRef>
+            <a:fontRef idx="minor">
+              <a:schemeClr val="tx1"/>
+            </a:fontRef>
+          </p:style>
+        </p:cxnSp>
+        <p:sp>
+          <p:nvSpPr>
+            <p:cNvPr id="50" name="TextBox 49">
+              <a:extLst>
+                <a:ext uri="{FF2B5EF4-FFF2-40B4-BE49-F238E27FC236}">
+                  <a16:creationId xmlns:a16="http://schemas.microsoft.com/office/drawing/2014/main" id="{33440BBC-86ED-3ABC-6588-7F459D4772C6}"/>
+                </a:ext>
+              </a:extLst>
+            </p:cNvPr>
+            <p:cNvSpPr txBox="1"/>
+            <p:nvPr/>
+          </p:nvSpPr>
+          <p:spPr>
+            <a:xfrm>
+              <a:off x="6544142" y="4715354"/>
+              <a:ext cx="5176379" cy="400110"/>
+            </a:xfrm>
+            <a:prstGeom prst="rect">
+              <a:avLst/>
+            </a:prstGeom>
+            <a:solidFill>
+              <a:srgbClr val="5D8D8C"/>
+            </a:solidFill>
+            <a:ln>
+              <a:solidFill>
+                <a:srgbClr val="5D8D8C"/>
+              </a:solidFill>
+            </a:ln>
+          </p:spPr>
+          <p:txBody>
+            <a:bodyPr wrap="square" rtlCol="0">
+              <a:spAutoFit/>
+            </a:bodyPr>
+            <a:lstStyle/>
+            <a:p>
+              <a:r>
+                <a:rPr lang="en-GB" sz="2000" dirty="0">
+                  <a:effectLst/>
+                  <a:ea typeface="Calibri" panose="020F0502020204030204" pitchFamily="34" charset="0"/>
+                  <a:cs typeface="Courier New" panose="02070309020205020404" pitchFamily="49" charset="0"/>
+                </a:rPr>
+                <a:t>Adds an extra row and column displaying totals</a:t>
+              </a:r>
+            </a:p>
+          </p:txBody>
+        </p:sp>
+      </p:grpSp>
+      <p:grpSp>
+        <p:nvGrpSpPr>
+          <p:cNvPr id="108" name="Group 107">
+            <a:extLst>
+              <a:ext uri="{FF2B5EF4-FFF2-40B4-BE49-F238E27FC236}">
+                <a16:creationId xmlns:a16="http://schemas.microsoft.com/office/drawing/2014/main" id="{3A2E9D45-C1C4-8799-46C6-EB5ED3AC1BA1}"/>
+              </a:ext>
+            </a:extLst>
+          </p:cNvPr>
+          <p:cNvGrpSpPr/>
+          <p:nvPr/>
+        </p:nvGrpSpPr>
+        <p:grpSpPr>
+          <a:xfrm>
+            <a:off x="1885950" y="3714750"/>
+            <a:ext cx="1134836" cy="2124075"/>
+            <a:chOff x="1885950" y="3714750"/>
+            <a:chExt cx="1134836" cy="2124075"/>
+          </a:xfrm>
+        </p:grpSpPr>
+        <p:cxnSp>
+          <p:nvCxnSpPr>
+            <p:cNvPr id="61" name="Straight Connector 60">
+              <a:extLst>
+                <a:ext uri="{FF2B5EF4-FFF2-40B4-BE49-F238E27FC236}">
+                  <a16:creationId xmlns:a16="http://schemas.microsoft.com/office/drawing/2014/main" id="{63D7DBD2-DBC7-5C79-AADB-23CB876F6649}"/>
+                </a:ext>
+              </a:extLst>
+            </p:cNvPr>
+            <p:cNvCxnSpPr>
+              <a:cxnSpLocks/>
+            </p:cNvCxnSpPr>
+            <p:nvPr/>
+          </p:nvCxnSpPr>
+          <p:spPr>
+            <a:xfrm flipV="1">
+              <a:off x="2983407" y="4095750"/>
+              <a:ext cx="0" cy="1743075"/>
+            </a:xfrm>
+            <a:prstGeom prst="line">
+              <a:avLst/>
+            </a:prstGeom>
+            <a:ln w="76200">
+              <a:solidFill>
+                <a:srgbClr val="9CBEBD"/>
+              </a:solidFill>
+            </a:ln>
+          </p:spPr>
+          <p:style>
+            <a:lnRef idx="1">
+              <a:schemeClr val="accent1"/>
+            </a:lnRef>
+            <a:fillRef idx="0">
+              <a:schemeClr val="accent1"/>
+            </a:fillRef>
+            <a:effectRef idx="0">
+              <a:schemeClr val="accent1"/>
+            </a:effectRef>
+            <a:fontRef idx="minor">
+              <a:schemeClr val="tx1"/>
+            </a:fontRef>
+          </p:style>
+        </p:cxnSp>
+        <p:cxnSp>
+          <p:nvCxnSpPr>
+            <p:cNvPr id="64" name="Straight Connector 63">
+              <a:extLst>
+                <a:ext uri="{FF2B5EF4-FFF2-40B4-BE49-F238E27FC236}">
+                  <a16:creationId xmlns:a16="http://schemas.microsoft.com/office/drawing/2014/main" id="{761A57EA-957A-E377-7ADE-AA51756807D9}"/>
+                </a:ext>
+              </a:extLst>
+            </p:cNvPr>
+            <p:cNvCxnSpPr>
+              <a:cxnSpLocks/>
+            </p:cNvCxnSpPr>
+            <p:nvPr/>
+          </p:nvCxnSpPr>
+          <p:spPr>
+            <a:xfrm flipH="1" flipV="1">
+              <a:off x="1885950" y="4095750"/>
+              <a:ext cx="1134836" cy="9525"/>
+            </a:xfrm>
+            <a:prstGeom prst="line">
+              <a:avLst/>
+            </a:prstGeom>
+            <a:ln w="76200">
+              <a:solidFill>
+                <a:srgbClr val="9CBEBD"/>
+              </a:solidFill>
+            </a:ln>
+          </p:spPr>
+          <p:style>
+            <a:lnRef idx="1">
+              <a:schemeClr val="accent1"/>
+            </a:lnRef>
+            <a:fillRef idx="0">
+              <a:schemeClr val="accent1"/>
+            </a:fillRef>
+            <a:effectRef idx="0">
+              <a:schemeClr val="accent1"/>
+            </a:effectRef>
+            <a:fontRef idx="minor">
+              <a:schemeClr val="tx1"/>
+            </a:fontRef>
+          </p:style>
+        </p:cxnSp>
+        <p:cxnSp>
+          <p:nvCxnSpPr>
+            <p:cNvPr id="71" name="Straight Connector 70">
+              <a:extLst>
+                <a:ext uri="{FF2B5EF4-FFF2-40B4-BE49-F238E27FC236}">
+                  <a16:creationId xmlns:a16="http://schemas.microsoft.com/office/drawing/2014/main" id="{7BA38ABB-92D6-C974-E924-1B3FCC85EC82}"/>
+                </a:ext>
+              </a:extLst>
+            </p:cNvPr>
+            <p:cNvCxnSpPr>
+              <a:cxnSpLocks/>
+            </p:cNvCxnSpPr>
+            <p:nvPr/>
+          </p:nvCxnSpPr>
+          <p:spPr>
+            <a:xfrm flipV="1">
+              <a:off x="1924050" y="3724275"/>
+              <a:ext cx="0" cy="381000"/>
+            </a:xfrm>
+            <a:prstGeom prst="line">
+              <a:avLst/>
+            </a:prstGeom>
+            <a:ln w="76200">
+              <a:solidFill>
+                <a:srgbClr val="9CBEBD"/>
+              </a:solidFill>
+            </a:ln>
+          </p:spPr>
+          <p:style>
+            <a:lnRef idx="1">
+              <a:schemeClr val="accent1"/>
+            </a:lnRef>
+            <a:fillRef idx="0">
+              <a:schemeClr val="accent1"/>
+            </a:fillRef>
+            <a:effectRef idx="0">
+              <a:schemeClr val="accent1"/>
+            </a:effectRef>
+            <a:fontRef idx="minor">
+              <a:schemeClr val="tx1"/>
+            </a:fontRef>
+          </p:style>
+        </p:cxnSp>
+        <p:cxnSp>
+          <p:nvCxnSpPr>
+            <p:cNvPr id="74" name="Straight Arrow Connector 73">
+              <a:extLst>
+                <a:ext uri="{FF2B5EF4-FFF2-40B4-BE49-F238E27FC236}">
+                  <a16:creationId xmlns:a16="http://schemas.microsoft.com/office/drawing/2014/main" id="{062DEA9B-F465-4F1F-F625-61A2BBA1D94D}"/>
+                </a:ext>
+              </a:extLst>
+            </p:cNvPr>
+            <p:cNvCxnSpPr>
+              <a:cxnSpLocks/>
+            </p:cNvCxnSpPr>
+            <p:nvPr/>
+          </p:nvCxnSpPr>
+          <p:spPr>
+            <a:xfrm>
+              <a:off x="1885950" y="3714750"/>
+              <a:ext cx="391811" cy="0"/>
+            </a:xfrm>
+            <a:prstGeom prst="straightConnector1">
+              <a:avLst/>
+            </a:prstGeom>
+            <a:ln w="76200">
+              <a:solidFill>
+                <a:srgbClr val="9CBEBD"/>
+              </a:solidFill>
+              <a:tailEnd type="triangle"/>
+            </a:ln>
+          </p:spPr>
+          <p:style>
+            <a:lnRef idx="1">
+              <a:schemeClr val="accent1"/>
+            </a:lnRef>
+            <a:fillRef idx="0">
+              <a:schemeClr val="accent1"/>
+            </a:fillRef>
+            <a:effectRef idx="0">
+              <a:schemeClr val="accent1"/>
+            </a:effectRef>
+            <a:fontRef idx="minor">
+              <a:schemeClr val="tx1"/>
+            </a:fontRef>
+          </p:style>
+        </p:cxnSp>
+      </p:grpSp>
+      <p:cxnSp>
+        <p:nvCxnSpPr>
+          <p:cNvPr id="84" name="Straight Connector 83">
+            <a:extLst>
+              <a:ext uri="{FF2B5EF4-FFF2-40B4-BE49-F238E27FC236}">
+                <a16:creationId xmlns:a16="http://schemas.microsoft.com/office/drawing/2014/main" id="{A1DBD6AA-F32F-1405-6575-9C85C3D8FB04}"/>
+              </a:ext>
+            </a:extLst>
+          </p:cNvPr>
+          <p:cNvCxnSpPr>
+            <a:cxnSpLocks/>
+          </p:cNvCxnSpPr>
+          <p:nvPr/>
+        </p:nvCxnSpPr>
+        <p:spPr>
+          <a:xfrm flipH="1">
+            <a:off x="6539380" y="4276725"/>
+            <a:ext cx="2492376" cy="9525"/>
+          </a:xfrm>
+          <a:prstGeom prst="line">
+            <a:avLst/>
+          </a:prstGeom>
+          <a:ln w="76200">
+            <a:solidFill>
+              <a:srgbClr val="5D8D8C"/>
+            </a:solidFill>
+          </a:ln>
+        </p:spPr>
+        <p:style>
+          <a:lnRef idx="1">
+            <a:schemeClr val="accent1"/>
+          </a:lnRef>
+          <a:fillRef idx="0">
+            <a:schemeClr val="accent1"/>
+          </a:fillRef>
+          <a:effectRef idx="0">
+            <a:schemeClr val="accent1"/>
+          </a:effectRef>
+          <a:fontRef idx="minor">
+            <a:schemeClr val="tx1"/>
+          </a:fontRef>
+        </p:style>
+      </p:cxnSp>
+      <p:cxnSp>
+        <p:nvCxnSpPr>
+          <p:cNvPr id="87" name="Straight Connector 86">
+            <a:extLst>
+              <a:ext uri="{FF2B5EF4-FFF2-40B4-BE49-F238E27FC236}">
+                <a16:creationId xmlns:a16="http://schemas.microsoft.com/office/drawing/2014/main" id="{3F4F95AC-4592-33B7-1FA2-8DD2A70381CF}"/>
+              </a:ext>
+            </a:extLst>
+          </p:cNvPr>
+          <p:cNvCxnSpPr>
+            <a:cxnSpLocks/>
+          </p:cNvCxnSpPr>
+          <p:nvPr/>
+        </p:nvCxnSpPr>
+        <p:spPr>
+          <a:xfrm flipV="1">
+            <a:off x="6576651" y="4276725"/>
+            <a:ext cx="0" cy="753014"/>
+          </a:xfrm>
+          <a:prstGeom prst="line">
+            <a:avLst/>
+          </a:prstGeom>
+          <a:ln w="76200">
+            <a:solidFill>
+              <a:srgbClr val="5D8D8C"/>
+            </a:solidFill>
+          </a:ln>
+        </p:spPr>
+        <p:style>
+          <a:lnRef idx="1">
+            <a:schemeClr val="accent1"/>
+          </a:lnRef>
+          <a:fillRef idx="0">
+            <a:schemeClr val="accent1"/>
+          </a:fillRef>
+          <a:effectRef idx="0">
+            <a:schemeClr val="accent1"/>
+          </a:effectRef>
+          <a:fontRef idx="minor">
+            <a:schemeClr val="tx1"/>
+          </a:fontRef>
+        </p:style>
+      </p:cxnSp>
+    </p:spTree>
+    <p:extLst>
+      <p:ext uri="{BB962C8B-B14F-4D97-AF65-F5344CB8AC3E}">
+        <p14:creationId xmlns:p14="http://schemas.microsoft.com/office/powerpoint/2010/main" val="461142754"/>
+      </p:ext>
+    </p:extLst>
+  </p:cSld>
+  <p:clrMapOvr>
+    <a:masterClrMapping/>
+  </p:clrMapOvr>
+</p:sld>
+</file>
+
+<file path=ppt/slides/slide12.xml><?xml version="1.0" encoding="utf-8"?>
+<p:sld xmlns:a="http://schemas.openxmlformats.org/drawingml/2006/main" xmlns:r="http://schemas.openxmlformats.org/officeDocument/2006/relationships" xmlns:p="http://schemas.openxmlformats.org/presentationml/2006/main">
+  <p:cSld>
+    <p:spTree>
+      <p:nvGrpSpPr>
+        <p:cNvPr id="1" name=""/>
+        <p:cNvGrpSpPr/>
+        <p:nvPr/>
+      </p:nvGrpSpPr>
+      <p:grpSpPr>
+        <a:xfrm>
+          <a:off x="0" y="0"/>
+          <a:ext cx="0" cy="0"/>
+          <a:chOff x="0" y="0"/>
+          <a:chExt cx="0" cy="0"/>
+        </a:xfrm>
+      </p:grpSpPr>
+      <p:sp>
+        <p:nvSpPr>
+          <p:cNvPr id="2" name="Title 1">
+            <a:extLst>
+              <a:ext uri="{FF2B5EF4-FFF2-40B4-BE49-F238E27FC236}">
+                <a16:creationId xmlns:a16="http://schemas.microsoft.com/office/drawing/2014/main" id="{518D9A5E-D95D-E081-C9C5-858975DD73C6}"/>
+              </a:ext>
+            </a:extLst>
+          </p:cNvPr>
+          <p:cNvSpPr>
+            <a:spLocks noGrp="1"/>
+          </p:cNvSpPr>
+          <p:nvPr>
+            <p:ph type="title"/>
+          </p:nvPr>
+        </p:nvSpPr>
+        <p:spPr/>
+        <p:txBody>
+          <a:bodyPr/>
+          <a:lstStyle/>
+          <a:p>
+            <a:r>
+              <a:rPr lang="en-GB" dirty="0"/>
+              <a:t>Triangles in Pandas</a:t>
+            </a:r>
+          </a:p>
+        </p:txBody>
+      </p:sp>
+      <p:pic>
+        <p:nvPicPr>
+          <p:cNvPr id="6" name="Picture 5">
+            <a:extLst>
+              <a:ext uri="{FF2B5EF4-FFF2-40B4-BE49-F238E27FC236}">
+                <a16:creationId xmlns:a16="http://schemas.microsoft.com/office/drawing/2014/main" id="{C936655E-2F51-1109-7700-D06B2E5F85D7}"/>
+              </a:ext>
+            </a:extLst>
+          </p:cNvPr>
+          <p:cNvPicPr>
+            <a:picLocks noChangeAspect="1"/>
+          </p:cNvPicPr>
+          <p:nvPr/>
+        </p:nvPicPr>
+        <p:blipFill>
+          <a:blip r:embed="rId3"/>
+          <a:stretch>
+            <a:fillRect/>
+          </a:stretch>
+        </p:blipFill>
+        <p:spPr>
+          <a:xfrm>
+            <a:off x="1024128" y="2898614"/>
+            <a:ext cx="4410691" cy="2305372"/>
+          </a:xfrm>
+          <a:prstGeom prst="rect">
+            <a:avLst/>
+          </a:prstGeom>
+        </p:spPr>
+      </p:pic>
+      <p:pic>
+        <p:nvPicPr>
+          <p:cNvPr id="9" name="Picture 8">
+            <a:extLst>
+              <a:ext uri="{FF2B5EF4-FFF2-40B4-BE49-F238E27FC236}">
+                <a16:creationId xmlns:a16="http://schemas.microsoft.com/office/drawing/2014/main" id="{E3500193-6933-2074-142C-B14878FB6255}"/>
+              </a:ext>
+            </a:extLst>
+          </p:cNvPr>
+          <p:cNvPicPr>
+            <a:picLocks noChangeAspect="1"/>
+          </p:cNvPicPr>
+          <p:nvPr/>
+        </p:nvPicPr>
+        <p:blipFill>
+          <a:blip r:embed="rId4"/>
+          <a:stretch>
+            <a:fillRect/>
+          </a:stretch>
+        </p:blipFill>
+        <p:spPr>
+          <a:xfrm>
+            <a:off x="7038096" y="2898614"/>
+            <a:ext cx="3706104" cy="2305372"/>
+          </a:xfrm>
+          <a:prstGeom prst="rect">
+            <a:avLst/>
+          </a:prstGeom>
+        </p:spPr>
+      </p:pic>
+      <p:sp>
+        <p:nvSpPr>
+          <p:cNvPr id="12" name="Flowchart: Connector 11">
+            <a:extLst>
+              <a:ext uri="{FF2B5EF4-FFF2-40B4-BE49-F238E27FC236}">
+                <a16:creationId xmlns:a16="http://schemas.microsoft.com/office/drawing/2014/main" id="{74161DD1-34C9-954D-9E36-7CFDE7444BD2}"/>
+              </a:ext>
+            </a:extLst>
+          </p:cNvPr>
+          <p:cNvSpPr/>
+          <p:nvPr/>
+        </p:nvSpPr>
+        <p:spPr>
+          <a:xfrm>
+            <a:off x="5947425" y="3954907"/>
+            <a:ext cx="136633" cy="154986"/>
+          </a:xfrm>
+          <a:prstGeom prst="flowChartConnector">
+            <a:avLst/>
+          </a:prstGeom>
+          <a:solidFill>
+            <a:schemeClr val="tx1"/>
+          </a:solidFill>
+          <a:ln>
+            <a:solidFill>
+              <a:schemeClr val="tx1"/>
+            </a:solidFill>
+          </a:ln>
+        </p:spPr>
+        <p:style>
+          <a:lnRef idx="2">
+            <a:schemeClr val="accent1">
+              <a:shade val="50000"/>
+            </a:schemeClr>
+          </a:lnRef>
+          <a:fillRef idx="1">
+            <a:schemeClr val="accent1"/>
+          </a:fillRef>
+          <a:effectRef idx="0">
+            <a:schemeClr val="accent1"/>
+          </a:effectRef>
+          <a:fontRef idx="minor">
+            <a:schemeClr val="lt1"/>
+          </a:fontRef>
+        </p:style>
+        <p:txBody>
+          <a:bodyPr rtlCol="0" anchor="ctr"/>
+          <a:lstStyle/>
+          <a:p>
+            <a:pPr algn="ctr"/>
+            <a:endParaRPr lang="en-GB"/>
+          </a:p>
+        </p:txBody>
+      </p:sp>
+      <p:sp>
+        <p:nvSpPr>
+          <p:cNvPr id="36" name="Flowchart: Connector 35">
+            <a:extLst>
+              <a:ext uri="{FF2B5EF4-FFF2-40B4-BE49-F238E27FC236}">
+                <a16:creationId xmlns:a16="http://schemas.microsoft.com/office/drawing/2014/main" id="{676175D6-89AA-50A2-313B-7D1A2133EC4D}"/>
+              </a:ext>
+            </a:extLst>
+          </p:cNvPr>
+          <p:cNvSpPr/>
+          <p:nvPr/>
+        </p:nvSpPr>
+        <p:spPr>
+          <a:xfrm>
+            <a:off x="6168141" y="3952321"/>
+            <a:ext cx="136633" cy="154986"/>
+          </a:xfrm>
+          <a:prstGeom prst="flowChartConnector">
+            <a:avLst/>
+          </a:prstGeom>
+          <a:solidFill>
+            <a:schemeClr val="tx1"/>
+          </a:solidFill>
+          <a:ln>
+            <a:solidFill>
+              <a:schemeClr val="tx1"/>
+            </a:solidFill>
+          </a:ln>
+        </p:spPr>
+        <p:style>
+          <a:lnRef idx="2">
+            <a:schemeClr val="accent1">
+              <a:shade val="50000"/>
+            </a:schemeClr>
+          </a:lnRef>
+          <a:fillRef idx="1">
+            <a:schemeClr val="accent1"/>
+          </a:fillRef>
+          <a:effectRef idx="0">
+            <a:schemeClr val="accent1"/>
+          </a:effectRef>
+          <a:fontRef idx="minor">
+            <a:schemeClr val="lt1"/>
+          </a:fontRef>
+        </p:style>
+        <p:txBody>
+          <a:bodyPr rtlCol="0" anchor="ctr"/>
+          <a:lstStyle/>
+          <a:p>
+            <a:pPr algn="ctr"/>
+            <a:endParaRPr lang="en-GB"/>
+          </a:p>
+        </p:txBody>
+      </p:sp>
+      <p:sp>
+        <p:nvSpPr>
+          <p:cNvPr id="37" name="Flowchart: Connector 36">
+            <a:extLst>
+              <a:ext uri="{FF2B5EF4-FFF2-40B4-BE49-F238E27FC236}">
+                <a16:creationId xmlns:a16="http://schemas.microsoft.com/office/drawing/2014/main" id="{F91AF3F4-103F-1EA1-1FA5-19181A0B8295}"/>
+              </a:ext>
+            </a:extLst>
+          </p:cNvPr>
+          <p:cNvSpPr/>
+          <p:nvPr/>
+        </p:nvSpPr>
+        <p:spPr>
+          <a:xfrm>
+            <a:off x="6388857" y="3952321"/>
+            <a:ext cx="136633" cy="154986"/>
+          </a:xfrm>
+          <a:prstGeom prst="flowChartConnector">
+            <a:avLst/>
+          </a:prstGeom>
+          <a:solidFill>
+            <a:schemeClr val="tx1"/>
+          </a:solidFill>
+          <a:ln>
+            <a:solidFill>
+              <a:schemeClr val="tx1"/>
+            </a:solidFill>
+          </a:ln>
+        </p:spPr>
+        <p:style>
+          <a:lnRef idx="2">
+            <a:schemeClr val="accent1">
+              <a:shade val="50000"/>
+            </a:schemeClr>
+          </a:lnRef>
+          <a:fillRef idx="1">
+            <a:schemeClr val="accent1"/>
+          </a:fillRef>
+          <a:effectRef idx="0">
+            <a:schemeClr val="accent1"/>
+          </a:effectRef>
+          <a:fontRef idx="minor">
+            <a:schemeClr val="lt1"/>
+          </a:fontRef>
+        </p:style>
+        <p:txBody>
+          <a:bodyPr rtlCol="0" anchor="ctr"/>
+          <a:lstStyle/>
+          <a:p>
+            <a:pPr algn="ctr"/>
+            <a:endParaRPr lang="en-GB"/>
+          </a:p>
+        </p:txBody>
+      </p:sp>
+    </p:spTree>
+    <p:extLst>
+      <p:ext uri="{BB962C8B-B14F-4D97-AF65-F5344CB8AC3E}">
+        <p14:creationId xmlns:p14="http://schemas.microsoft.com/office/powerpoint/2010/main" val="1510754107"/>
+      </p:ext>
+    </p:extLst>
+  </p:cSld>
+  <p:clrMapOvr>
+    <a:masterClrMapping/>
+  </p:clrMapOvr>
+</p:sld>
+</file>
+
+<file path=ppt/slides/slide13.xml><?xml version="1.0" encoding="utf-8"?>
+<p:sld xmlns:a="http://schemas.openxmlformats.org/drawingml/2006/main" xmlns:r="http://schemas.openxmlformats.org/officeDocument/2006/relationships" xmlns:p="http://schemas.openxmlformats.org/presentationml/2006/main">
+  <p:cSld>
+    <p:spTree>
+      <p:nvGrpSpPr>
+        <p:cNvPr id="1" name=""/>
+        <p:cNvGrpSpPr/>
+        <p:nvPr/>
+      </p:nvGrpSpPr>
+      <p:grpSpPr>
+        <a:xfrm>
+          <a:off x="0" y="0"/>
+          <a:ext cx="0" cy="0"/>
+          <a:chOff x="0" y="0"/>
+          <a:chExt cx="0" cy="0"/>
+        </a:xfrm>
+      </p:grpSpPr>
+      <p:pic>
+        <p:nvPicPr>
+          <p:cNvPr id="28" name="Picture 27">
+            <a:extLst>
+              <a:ext uri="{FF2B5EF4-FFF2-40B4-BE49-F238E27FC236}">
+                <a16:creationId xmlns:a16="http://schemas.microsoft.com/office/drawing/2014/main" id="{15C00F5E-7179-0380-29F7-84975D6DE9F6}"/>
+              </a:ext>
+            </a:extLst>
+          </p:cNvPr>
+          <p:cNvPicPr>
+            <a:picLocks noChangeAspect="1"/>
+          </p:cNvPicPr>
+          <p:nvPr/>
+        </p:nvPicPr>
+        <p:blipFill>
+          <a:blip r:embed="rId3"/>
+          <a:stretch>
+            <a:fillRect/>
+          </a:stretch>
+        </p:blipFill>
+        <p:spPr>
+          <a:xfrm>
+            <a:off x="1179886" y="2830088"/>
+            <a:ext cx="9653937" cy="2310015"/>
+          </a:xfrm>
+          <a:prstGeom prst="rect">
+            <a:avLst/>
+          </a:prstGeom>
+        </p:spPr>
+      </p:pic>
+      <p:sp>
+        <p:nvSpPr>
+          <p:cNvPr id="2" name="Title 1">
+            <a:extLst>
+              <a:ext uri="{FF2B5EF4-FFF2-40B4-BE49-F238E27FC236}">
+                <a16:creationId xmlns:a16="http://schemas.microsoft.com/office/drawing/2014/main" id="{57BF1497-F5FE-FD16-75F6-BF1DC8696C05}"/>
+              </a:ext>
+            </a:extLst>
+          </p:cNvPr>
+          <p:cNvSpPr>
+            <a:spLocks noGrp="1"/>
+          </p:cNvSpPr>
+          <p:nvPr>
+            <p:ph type="title"/>
+          </p:nvPr>
+        </p:nvSpPr>
+        <p:spPr/>
+        <p:txBody>
+          <a:bodyPr/>
+          <a:lstStyle/>
+          <a:p>
+            <a:r>
+              <a:rPr lang="en-GB" dirty="0"/>
+              <a:t>Graphs in pandas</a:t>
+            </a:r>
+          </a:p>
+        </p:txBody>
+      </p:sp>
+      <p:grpSp>
+        <p:nvGrpSpPr>
+          <p:cNvPr id="8" name="Group 7">
+            <a:extLst>
+              <a:ext uri="{FF2B5EF4-FFF2-40B4-BE49-F238E27FC236}">
+                <a16:creationId xmlns:a16="http://schemas.microsoft.com/office/drawing/2014/main" id="{8DEBAA4D-C23C-3940-23DF-5A9833141F2D}"/>
+              </a:ext>
+            </a:extLst>
+          </p:cNvPr>
+          <p:cNvGrpSpPr/>
+          <p:nvPr/>
+        </p:nvGrpSpPr>
+        <p:grpSpPr>
+          <a:xfrm>
+            <a:off x="1352364" y="1617801"/>
+            <a:ext cx="6941892" cy="1351736"/>
+            <a:chOff x="3724089" y="1379676"/>
+            <a:chExt cx="6941892" cy="1351736"/>
+          </a:xfrm>
+        </p:grpSpPr>
+        <p:cxnSp>
+          <p:nvCxnSpPr>
+            <p:cNvPr id="9" name="Straight Arrow Connector 8">
+              <a:extLst>
+                <a:ext uri="{FF2B5EF4-FFF2-40B4-BE49-F238E27FC236}">
+                  <a16:creationId xmlns:a16="http://schemas.microsoft.com/office/drawing/2014/main" id="{7D5D386E-9F95-F99D-4E5B-5534817784C7}"/>
+                </a:ext>
+              </a:extLst>
+            </p:cNvPr>
+            <p:cNvCxnSpPr>
+              <a:cxnSpLocks/>
+            </p:cNvCxnSpPr>
+            <p:nvPr/>
+          </p:nvCxnSpPr>
+          <p:spPr>
+            <a:xfrm>
+              <a:off x="3763663" y="1779786"/>
+              <a:ext cx="0" cy="951626"/>
+            </a:xfrm>
+            <a:prstGeom prst="straightConnector1">
+              <a:avLst/>
+            </a:prstGeom>
+            <a:ln w="76200">
+              <a:solidFill>
+                <a:srgbClr val="9CBEBD"/>
+              </a:solidFill>
+              <a:tailEnd type="triangle"/>
+            </a:ln>
+          </p:spPr>
+          <p:style>
+            <a:lnRef idx="1">
+              <a:schemeClr val="accent1"/>
+            </a:lnRef>
+            <a:fillRef idx="0">
+              <a:schemeClr val="accent1"/>
+            </a:fillRef>
+            <a:effectRef idx="0">
+              <a:schemeClr val="accent1"/>
+            </a:effectRef>
+            <a:fontRef idx="minor">
+              <a:schemeClr val="tx1"/>
+            </a:fontRef>
+          </p:style>
+        </p:cxnSp>
+        <p:sp>
+          <p:nvSpPr>
+            <p:cNvPr id="10" name="TextBox 9">
+              <a:extLst>
+                <a:ext uri="{FF2B5EF4-FFF2-40B4-BE49-F238E27FC236}">
+                  <a16:creationId xmlns:a16="http://schemas.microsoft.com/office/drawing/2014/main" id="{FF6947D6-38F9-7744-B4DD-044251BE39C2}"/>
+                </a:ext>
+              </a:extLst>
+            </p:cNvPr>
+            <p:cNvSpPr txBox="1"/>
+            <p:nvPr/>
+          </p:nvSpPr>
+          <p:spPr>
+            <a:xfrm>
+              <a:off x="3724089" y="1379676"/>
+              <a:ext cx="6941892" cy="400110"/>
+            </a:xfrm>
+            <a:prstGeom prst="rect">
+              <a:avLst/>
+            </a:prstGeom>
+            <a:solidFill>
+              <a:srgbClr val="9CBEBD"/>
+            </a:solidFill>
+          </p:spPr>
+          <p:txBody>
+            <a:bodyPr wrap="square" rtlCol="0">
+              <a:spAutoFit/>
+            </a:bodyPr>
+            <a:lstStyle/>
+            <a:p>
+              <a:r>
+                <a:rPr lang="en-GB" sz="2000" dirty="0">
+                  <a:effectLst/>
+                  <a:ea typeface="Calibri" panose="020F0502020204030204" pitchFamily="34" charset="0"/>
+                  <a:cs typeface="Courier New" panose="02070309020205020404" pitchFamily="49" charset="0"/>
+                </a:rPr>
+                <a:t>Easily remove extraneous columns (we don’t want to plot the Totals)</a:t>
+              </a:r>
+            </a:p>
+          </p:txBody>
+        </p:sp>
+      </p:grpSp>
+      <p:cxnSp>
+        <p:nvCxnSpPr>
+          <p:cNvPr id="15" name="Straight Arrow Connector 14">
+            <a:extLst>
+              <a:ext uri="{FF2B5EF4-FFF2-40B4-BE49-F238E27FC236}">
+                <a16:creationId xmlns:a16="http://schemas.microsoft.com/office/drawing/2014/main" id="{A41A7632-FAB0-8BB6-78CE-9A5D829C509E}"/>
+              </a:ext>
+            </a:extLst>
+          </p:cNvPr>
+          <p:cNvCxnSpPr>
+            <a:cxnSpLocks/>
+          </p:cNvCxnSpPr>
+          <p:nvPr/>
+        </p:nvCxnSpPr>
+        <p:spPr>
+          <a:xfrm flipH="1">
+            <a:off x="4823310" y="3493238"/>
+            <a:ext cx="1183544" cy="0"/>
+          </a:xfrm>
+          <a:prstGeom prst="straightConnector1">
+            <a:avLst/>
+          </a:prstGeom>
+          <a:ln w="76200">
+            <a:solidFill>
+              <a:srgbClr val="77A5A4"/>
+            </a:solidFill>
+            <a:tailEnd type="triangle"/>
+          </a:ln>
+        </p:spPr>
+        <p:style>
+          <a:lnRef idx="1">
+            <a:schemeClr val="accent1"/>
+          </a:lnRef>
+          <a:fillRef idx="0">
+            <a:schemeClr val="accent1"/>
+          </a:fillRef>
+          <a:effectRef idx="0">
+            <a:schemeClr val="accent1"/>
+          </a:effectRef>
+          <a:fontRef idx="minor">
+            <a:schemeClr val="tx1"/>
+          </a:fontRef>
+        </p:style>
+      </p:cxnSp>
+      <p:sp>
+        <p:nvSpPr>
+          <p:cNvPr id="16" name="TextBox 15">
+            <a:extLst>
+              <a:ext uri="{FF2B5EF4-FFF2-40B4-BE49-F238E27FC236}">
+                <a16:creationId xmlns:a16="http://schemas.microsoft.com/office/drawing/2014/main" id="{E6140070-CC53-7DBD-398B-67AF38877ADB}"/>
+              </a:ext>
+            </a:extLst>
+          </p:cNvPr>
+          <p:cNvSpPr txBox="1"/>
+          <p:nvPr/>
+        </p:nvSpPr>
+        <p:spPr>
+          <a:xfrm>
+            <a:off x="2156733" y="2190483"/>
+            <a:ext cx="8142936" cy="400110"/>
+          </a:xfrm>
+          <a:prstGeom prst="rect">
+            <a:avLst/>
+          </a:prstGeom>
+          <a:solidFill>
+            <a:srgbClr val="77A5A4"/>
+          </a:solidFill>
+          <a:ln>
+            <a:solidFill>
+              <a:srgbClr val="77A5A4"/>
+            </a:solidFill>
+          </a:ln>
+        </p:spPr>
+        <p:txBody>
+          <a:bodyPr wrap="square" rtlCol="0">
+            <a:spAutoFit/>
+          </a:bodyPr>
+          <a:lstStyle/>
+          <a:p>
+            <a:r>
+              <a:rPr lang="en-GB" sz="2000" dirty="0">
+                <a:ea typeface="Calibri" panose="020F0502020204030204" pitchFamily="34" charset="0"/>
+                <a:cs typeface="Courier New" panose="02070309020205020404" pitchFamily="49" charset="0"/>
+              </a:rPr>
+              <a:t>Create the graph (transpose the DataFrame so the correct columns are plotted</a:t>
+            </a:r>
+            <a:endParaRPr lang="en-GB" sz="2000" dirty="0">
+              <a:effectLst/>
+              <a:ea typeface="Calibri" panose="020F0502020204030204" pitchFamily="34" charset="0"/>
+              <a:cs typeface="Courier New" panose="02070309020205020404" pitchFamily="49" charset="0"/>
+            </a:endParaRPr>
+          </a:p>
+        </p:txBody>
+      </p:sp>
+      <p:grpSp>
+        <p:nvGrpSpPr>
+          <p:cNvPr id="18" name="Group 17">
+            <a:extLst>
+              <a:ext uri="{FF2B5EF4-FFF2-40B4-BE49-F238E27FC236}">
+                <a16:creationId xmlns:a16="http://schemas.microsoft.com/office/drawing/2014/main" id="{C5124FBE-59B0-D2B1-29FA-1156662FC83D}"/>
+              </a:ext>
+            </a:extLst>
+          </p:cNvPr>
+          <p:cNvGrpSpPr/>
+          <p:nvPr/>
+        </p:nvGrpSpPr>
+        <p:grpSpPr>
+          <a:xfrm>
+            <a:off x="1345360" y="4998171"/>
+            <a:ext cx="3177064" cy="1544533"/>
+            <a:chOff x="6586675" y="3483379"/>
+            <a:chExt cx="3177064" cy="1544533"/>
+          </a:xfrm>
+          <a:solidFill>
+            <a:srgbClr val="9CBEBD"/>
+          </a:solidFill>
+        </p:grpSpPr>
+        <p:cxnSp>
+          <p:nvCxnSpPr>
+            <p:cNvPr id="19" name="Straight Arrow Connector 18">
+              <a:extLst>
+                <a:ext uri="{FF2B5EF4-FFF2-40B4-BE49-F238E27FC236}">
+                  <a16:creationId xmlns:a16="http://schemas.microsoft.com/office/drawing/2014/main" id="{946F628C-7A2F-3446-531D-4DDFB0069EB1}"/>
+                </a:ext>
+              </a:extLst>
+            </p:cNvPr>
+            <p:cNvCxnSpPr>
+              <a:cxnSpLocks/>
+            </p:cNvCxnSpPr>
+            <p:nvPr/>
+          </p:nvCxnSpPr>
+          <p:spPr>
+            <a:xfrm flipV="1">
+              <a:off x="6616307" y="3483379"/>
+              <a:ext cx="0" cy="1460995"/>
+            </a:xfrm>
+            <a:prstGeom prst="straightConnector1">
+              <a:avLst/>
+            </a:prstGeom>
+            <a:grpFill/>
+            <a:ln w="76200">
+              <a:solidFill>
+                <a:srgbClr val="9CBEBD"/>
+              </a:solidFill>
+              <a:tailEnd type="triangle"/>
+            </a:ln>
+          </p:spPr>
+          <p:style>
+            <a:lnRef idx="1">
+              <a:schemeClr val="accent1"/>
+            </a:lnRef>
+            <a:fillRef idx="0">
+              <a:schemeClr val="accent1"/>
+            </a:fillRef>
+            <a:effectRef idx="0">
+              <a:schemeClr val="accent1"/>
+            </a:effectRef>
+            <a:fontRef idx="minor">
+              <a:schemeClr val="tx1"/>
+            </a:fontRef>
+          </p:style>
+        </p:cxnSp>
+        <p:sp>
+          <p:nvSpPr>
+            <p:cNvPr id="20" name="TextBox 19">
+              <a:extLst>
+                <a:ext uri="{FF2B5EF4-FFF2-40B4-BE49-F238E27FC236}">
+                  <a16:creationId xmlns:a16="http://schemas.microsoft.com/office/drawing/2014/main" id="{E10F3D84-D56F-6541-5C62-C57391E06FF3}"/>
+                </a:ext>
+              </a:extLst>
+            </p:cNvPr>
+            <p:cNvSpPr txBox="1"/>
+            <p:nvPr/>
+          </p:nvSpPr>
+          <p:spPr>
+            <a:xfrm>
+              <a:off x="6586675" y="4627802"/>
+              <a:ext cx="3177064" cy="400110"/>
+            </a:xfrm>
+            <a:prstGeom prst="rect">
+              <a:avLst/>
+            </a:prstGeom>
+            <a:grpFill/>
+            <a:ln>
+              <a:solidFill>
+                <a:srgbClr val="9CBEBD"/>
+              </a:solidFill>
+            </a:ln>
+          </p:spPr>
+          <p:txBody>
+            <a:bodyPr wrap="square" rtlCol="0">
+              <a:spAutoFit/>
+            </a:bodyPr>
+            <a:lstStyle/>
+            <a:p>
+              <a:r>
+                <a:rPr lang="en-GB" sz="2000" dirty="0">
+                  <a:effectLst/>
+                  <a:ea typeface="Calibri" panose="020F0502020204030204" pitchFamily="34" charset="0"/>
+                  <a:cs typeface="Courier New" panose="02070309020205020404" pitchFamily="49" charset="0"/>
+                </a:rPr>
+                <a:t>Display the graph we plotted</a:t>
+              </a:r>
+            </a:p>
+          </p:txBody>
+        </p:sp>
+      </p:grpSp>
+      <p:cxnSp>
+        <p:nvCxnSpPr>
+          <p:cNvPr id="33" name="Straight Connector 32">
+            <a:extLst>
+              <a:ext uri="{FF2B5EF4-FFF2-40B4-BE49-F238E27FC236}">
+                <a16:creationId xmlns:a16="http://schemas.microsoft.com/office/drawing/2014/main" id="{19085075-4877-E245-04EE-1CF39B3E377D}"/>
+              </a:ext>
+            </a:extLst>
+          </p:cNvPr>
+          <p:cNvCxnSpPr>
+            <a:cxnSpLocks/>
+          </p:cNvCxnSpPr>
+          <p:nvPr/>
+        </p:nvCxnSpPr>
+        <p:spPr>
+          <a:xfrm>
+            <a:off x="6006854" y="2496899"/>
+            <a:ext cx="0" cy="1033701"/>
+          </a:xfrm>
+          <a:prstGeom prst="line">
+            <a:avLst/>
+          </a:prstGeom>
+          <a:ln w="76200">
+            <a:solidFill>
+              <a:srgbClr val="77A5A4"/>
+            </a:solidFill>
+          </a:ln>
+        </p:spPr>
+        <p:style>
+          <a:lnRef idx="1">
+            <a:schemeClr val="accent1"/>
+          </a:lnRef>
+          <a:fillRef idx="0">
+            <a:schemeClr val="accent1"/>
+          </a:fillRef>
+          <a:effectRef idx="0">
+            <a:schemeClr val="accent1"/>
+          </a:effectRef>
+          <a:fontRef idx="minor">
+            <a:schemeClr val="tx1"/>
+          </a:fontRef>
+        </p:style>
+      </p:cxnSp>
+      <p:sp>
+        <p:nvSpPr>
+          <p:cNvPr id="47" name="TextBox 46">
+            <a:extLst>
+              <a:ext uri="{FF2B5EF4-FFF2-40B4-BE49-F238E27FC236}">
+                <a16:creationId xmlns:a16="http://schemas.microsoft.com/office/drawing/2014/main" id="{EA7942C8-2038-1CA1-C7CA-B65457B85729}"/>
+              </a:ext>
+            </a:extLst>
+          </p:cNvPr>
+          <p:cNvSpPr txBox="1"/>
+          <p:nvPr/>
+        </p:nvSpPr>
+        <p:spPr>
+          <a:xfrm>
+            <a:off x="1725722" y="5510237"/>
+            <a:ext cx="6157360" cy="400110"/>
+          </a:xfrm>
+          <a:prstGeom prst="rect">
+            <a:avLst/>
+          </a:prstGeom>
+          <a:solidFill>
+            <a:srgbClr val="77A5A4"/>
+          </a:solidFill>
+          <a:ln>
+            <a:solidFill>
+              <a:srgbClr val="77A5A4"/>
+            </a:solidFill>
+          </a:ln>
+        </p:spPr>
+        <p:txBody>
+          <a:bodyPr wrap="square" rtlCol="0">
+            <a:spAutoFit/>
+          </a:bodyPr>
+          <a:lstStyle/>
+          <a:p>
+            <a:r>
+              <a:rPr lang="en-GB" sz="2000" dirty="0">
+                <a:ea typeface="Calibri" panose="020F0502020204030204" pitchFamily="34" charset="0"/>
+                <a:cs typeface="Courier New" panose="02070309020205020404" pitchFamily="49" charset="0"/>
+              </a:rPr>
+              <a:t>A function to improve the formatting of values on the y axis</a:t>
+            </a:r>
+            <a:endParaRPr lang="en-GB" sz="2000" dirty="0">
+              <a:effectLst/>
+              <a:ea typeface="Calibri" panose="020F0502020204030204" pitchFamily="34" charset="0"/>
+              <a:cs typeface="Courier New" panose="02070309020205020404" pitchFamily="49" charset="0"/>
+            </a:endParaRPr>
+          </a:p>
+        </p:txBody>
+      </p:sp>
+      <p:cxnSp>
+        <p:nvCxnSpPr>
+          <p:cNvPr id="48" name="Straight Arrow Connector 47">
+            <a:extLst>
+              <a:ext uri="{FF2B5EF4-FFF2-40B4-BE49-F238E27FC236}">
+                <a16:creationId xmlns:a16="http://schemas.microsoft.com/office/drawing/2014/main" id="{8EC1ABED-C8A6-20BD-476C-EF099BD32A48}"/>
+              </a:ext>
+            </a:extLst>
+          </p:cNvPr>
+          <p:cNvCxnSpPr>
+            <a:cxnSpLocks/>
+          </p:cNvCxnSpPr>
+          <p:nvPr/>
+        </p:nvCxnSpPr>
+        <p:spPr>
+          <a:xfrm flipH="1">
+            <a:off x="5209173" y="4245159"/>
+            <a:ext cx="2641048" cy="0"/>
+          </a:xfrm>
+          <a:prstGeom prst="straightConnector1">
+            <a:avLst/>
+          </a:prstGeom>
+          <a:ln w="76200">
+            <a:solidFill>
+              <a:srgbClr val="77A5A4"/>
+            </a:solidFill>
+            <a:tailEnd type="triangle"/>
+          </a:ln>
+        </p:spPr>
+        <p:style>
+          <a:lnRef idx="1">
+            <a:schemeClr val="accent1"/>
+          </a:lnRef>
+          <a:fillRef idx="0">
+            <a:schemeClr val="accent1"/>
+          </a:fillRef>
+          <a:effectRef idx="0">
+            <a:schemeClr val="accent1"/>
+          </a:effectRef>
+          <a:fontRef idx="minor">
+            <a:schemeClr val="tx1"/>
+          </a:fontRef>
+        </p:style>
+      </p:cxnSp>
+      <p:cxnSp>
+        <p:nvCxnSpPr>
+          <p:cNvPr id="53" name="Straight Arrow Connector 52">
+            <a:extLst>
+              <a:ext uri="{FF2B5EF4-FFF2-40B4-BE49-F238E27FC236}">
+                <a16:creationId xmlns:a16="http://schemas.microsoft.com/office/drawing/2014/main" id="{C4853951-F40A-C477-8CD5-DD6614850C3E}"/>
+              </a:ext>
+            </a:extLst>
+          </p:cNvPr>
+          <p:cNvCxnSpPr>
+            <a:cxnSpLocks/>
+          </p:cNvCxnSpPr>
+          <p:nvPr/>
+        </p:nvCxnSpPr>
+        <p:spPr>
+          <a:xfrm>
+            <a:off x="6638925" y="4245159"/>
+            <a:ext cx="0" cy="326841"/>
+          </a:xfrm>
+          <a:prstGeom prst="straightConnector1">
+            <a:avLst/>
+          </a:prstGeom>
+          <a:ln w="76200">
+            <a:solidFill>
+              <a:srgbClr val="77A5A4"/>
+            </a:solidFill>
+            <a:tailEnd type="triangle"/>
+          </a:ln>
+        </p:spPr>
+        <p:style>
+          <a:lnRef idx="1">
+            <a:schemeClr val="accent1"/>
+          </a:lnRef>
+          <a:fillRef idx="0">
+            <a:schemeClr val="accent1"/>
+          </a:fillRef>
+          <a:effectRef idx="0">
+            <a:schemeClr val="accent1"/>
+          </a:effectRef>
+          <a:fontRef idx="minor">
+            <a:schemeClr val="tx1"/>
+          </a:fontRef>
+        </p:style>
+      </p:cxnSp>
+      <p:cxnSp>
+        <p:nvCxnSpPr>
+          <p:cNvPr id="57" name="Straight Connector 56">
+            <a:extLst>
+              <a:ext uri="{FF2B5EF4-FFF2-40B4-BE49-F238E27FC236}">
+                <a16:creationId xmlns:a16="http://schemas.microsoft.com/office/drawing/2014/main" id="{D9478675-AC42-6E60-561B-4171D1E6334D}"/>
+              </a:ext>
+            </a:extLst>
+          </p:cNvPr>
+          <p:cNvCxnSpPr>
+            <a:cxnSpLocks/>
+          </p:cNvCxnSpPr>
+          <p:nvPr/>
+        </p:nvCxnSpPr>
+        <p:spPr>
+          <a:xfrm>
+            <a:off x="7850221" y="4207669"/>
+            <a:ext cx="0" cy="1346823"/>
+          </a:xfrm>
+          <a:prstGeom prst="line">
+            <a:avLst/>
+          </a:prstGeom>
+          <a:ln w="76200">
+            <a:solidFill>
+              <a:srgbClr val="77A5A4"/>
+            </a:solidFill>
+          </a:ln>
+        </p:spPr>
+        <p:style>
+          <a:lnRef idx="1">
+            <a:schemeClr val="accent1"/>
+          </a:lnRef>
+          <a:fillRef idx="0">
+            <a:schemeClr val="accent1"/>
+          </a:fillRef>
+          <a:effectRef idx="0">
+            <a:schemeClr val="accent1"/>
+          </a:effectRef>
+          <a:fontRef idx="minor">
+            <a:schemeClr val="tx1"/>
+          </a:fontRef>
+        </p:style>
+      </p:cxnSp>
+      <p:grpSp>
+        <p:nvGrpSpPr>
+          <p:cNvPr id="61" name="Group 60">
+            <a:extLst>
+              <a:ext uri="{FF2B5EF4-FFF2-40B4-BE49-F238E27FC236}">
+                <a16:creationId xmlns:a16="http://schemas.microsoft.com/office/drawing/2014/main" id="{7B400118-FA9D-EBD2-8483-B07D0F42E9EF}"/>
+              </a:ext>
+            </a:extLst>
+          </p:cNvPr>
+          <p:cNvGrpSpPr/>
+          <p:nvPr/>
+        </p:nvGrpSpPr>
+        <p:grpSpPr>
+          <a:xfrm flipV="1">
+            <a:off x="8308425" y="3985095"/>
+            <a:ext cx="2508583" cy="2202991"/>
+            <a:chOff x="8377995" y="2610193"/>
+            <a:chExt cx="2508583" cy="2202991"/>
+          </a:xfrm>
+        </p:grpSpPr>
+        <p:cxnSp>
+          <p:nvCxnSpPr>
+            <p:cNvPr id="62" name="Straight Arrow Connector 61">
+              <a:extLst>
+                <a:ext uri="{FF2B5EF4-FFF2-40B4-BE49-F238E27FC236}">
+                  <a16:creationId xmlns:a16="http://schemas.microsoft.com/office/drawing/2014/main" id="{38B62050-42E3-4E86-D1A5-F08E459EC9EE}"/>
+                </a:ext>
+              </a:extLst>
+            </p:cNvPr>
+            <p:cNvCxnSpPr>
+              <a:cxnSpLocks/>
+            </p:cNvCxnSpPr>
+            <p:nvPr/>
+          </p:nvCxnSpPr>
+          <p:spPr>
+            <a:xfrm flipH="1">
+              <a:off x="8377995" y="2859618"/>
+              <a:ext cx="32522" cy="1953566"/>
+            </a:xfrm>
+            <a:prstGeom prst="straightConnector1">
+              <a:avLst/>
+            </a:prstGeom>
+            <a:ln w="76200">
+              <a:solidFill>
+                <a:srgbClr val="5D8D8C"/>
+              </a:solidFill>
+              <a:tailEnd type="triangle"/>
+            </a:ln>
+          </p:spPr>
+          <p:style>
+            <a:lnRef idx="1">
+              <a:schemeClr val="accent1"/>
+            </a:lnRef>
+            <a:fillRef idx="0">
+              <a:schemeClr val="accent1"/>
+            </a:fillRef>
+            <a:effectRef idx="0">
+              <a:schemeClr val="accent1"/>
+            </a:effectRef>
+            <a:fontRef idx="minor">
+              <a:schemeClr val="tx1"/>
+            </a:fontRef>
+          </p:style>
+        </p:cxnSp>
+        <p:sp>
+          <p:nvSpPr>
+            <p:cNvPr id="63" name="TextBox 62">
+              <a:extLst>
+                <a:ext uri="{FF2B5EF4-FFF2-40B4-BE49-F238E27FC236}">
+                  <a16:creationId xmlns:a16="http://schemas.microsoft.com/office/drawing/2014/main" id="{46E42811-6D2C-C25B-10CD-D9CFACBD83C3}"/>
+                </a:ext>
+              </a:extLst>
+            </p:cNvPr>
+            <p:cNvSpPr txBox="1"/>
+            <p:nvPr/>
+          </p:nvSpPr>
+          <p:spPr>
+            <a:xfrm flipV="1">
+              <a:off x="8377995" y="2610193"/>
+              <a:ext cx="2508583" cy="400110"/>
+            </a:xfrm>
+            <a:prstGeom prst="rect">
+              <a:avLst/>
+            </a:prstGeom>
+            <a:solidFill>
+              <a:srgbClr val="5D8D8C"/>
+            </a:solidFill>
+            <a:ln>
+              <a:solidFill>
+                <a:srgbClr val="5D8D8C"/>
+              </a:solidFill>
+            </a:ln>
+          </p:spPr>
+          <p:txBody>
+            <a:bodyPr wrap="square" rtlCol="0">
+              <a:spAutoFit/>
+            </a:bodyPr>
+            <a:lstStyle/>
+            <a:p>
+              <a:r>
+                <a:rPr lang="en-GB" sz="2000" dirty="0">
+                  <a:effectLst/>
+                  <a:ea typeface="Calibri" panose="020F0502020204030204" pitchFamily="34" charset="0"/>
+                  <a:cs typeface="Courier New" panose="02070309020205020404" pitchFamily="49" charset="0"/>
+                </a:rPr>
+                <a:t>Add titles to the graph</a:t>
+              </a:r>
+            </a:p>
+          </p:txBody>
+        </p:sp>
+      </p:grpSp>
+    </p:spTree>
+    <p:extLst>
+      <p:ext uri="{BB962C8B-B14F-4D97-AF65-F5344CB8AC3E}">
+        <p14:creationId xmlns:p14="http://schemas.microsoft.com/office/powerpoint/2010/main" val="805961583"/>
+      </p:ext>
+    </p:extLst>
+  </p:cSld>
+  <p:clrMapOvr>
+    <a:masterClrMapping/>
+  </p:clrMapOvr>
+</p:sld>
+</file>
+
+<file path=ppt/slides/slide14.xml><?xml version="1.0" encoding="utf-8"?>
+<p:sld xmlns:a="http://schemas.openxmlformats.org/drawingml/2006/main" xmlns:r="http://schemas.openxmlformats.org/officeDocument/2006/relationships" xmlns:p="http://schemas.openxmlformats.org/presentationml/2006/main">
+  <p:cSld>
+    <p:spTree>
+      <p:nvGrpSpPr>
+        <p:cNvPr id="1" name=""/>
+        <p:cNvGrpSpPr/>
+        <p:nvPr/>
+      </p:nvGrpSpPr>
+      <p:grpSpPr>
+        <a:xfrm>
+          <a:off x="0" y="0"/>
+          <a:ext cx="0" cy="0"/>
+          <a:chOff x="0" y="0"/>
+          <a:chExt cx="0" cy="0"/>
+        </a:xfrm>
+      </p:grpSpPr>
+      <p:sp>
+        <p:nvSpPr>
+          <p:cNvPr id="2" name="Title 1">
+            <a:extLst>
+              <a:ext uri="{FF2B5EF4-FFF2-40B4-BE49-F238E27FC236}">
+                <a16:creationId xmlns:a16="http://schemas.microsoft.com/office/drawing/2014/main" id="{57BF1497-F5FE-FD16-75F6-BF1DC8696C05}"/>
+              </a:ext>
+            </a:extLst>
+          </p:cNvPr>
+          <p:cNvSpPr>
+            <a:spLocks noGrp="1"/>
+          </p:cNvSpPr>
+          <p:nvPr>
+            <p:ph type="title"/>
+          </p:nvPr>
+        </p:nvSpPr>
+        <p:spPr/>
+        <p:txBody>
+          <a:bodyPr/>
+          <a:lstStyle/>
+          <a:p>
+            <a:r>
+              <a:rPr lang="en-GB" dirty="0"/>
+              <a:t>Graphs in pandas</a:t>
+            </a:r>
+          </a:p>
+        </p:txBody>
+      </p:sp>
+      <p:pic>
+        <p:nvPicPr>
+          <p:cNvPr id="5" name="Picture 4">
+            <a:extLst>
+              <a:ext uri="{FF2B5EF4-FFF2-40B4-BE49-F238E27FC236}">
+                <a16:creationId xmlns:a16="http://schemas.microsoft.com/office/drawing/2014/main" id="{A429181E-7643-1075-EE99-12646AA277D3}"/>
+              </a:ext>
+            </a:extLst>
+          </p:cNvPr>
+          <p:cNvPicPr>
+            <a:picLocks noChangeAspect="1"/>
+          </p:cNvPicPr>
+          <p:nvPr/>
+        </p:nvPicPr>
+        <p:blipFill>
+          <a:blip r:embed="rId2"/>
+          <a:stretch>
+            <a:fillRect/>
+          </a:stretch>
+        </p:blipFill>
+        <p:spPr>
+          <a:xfrm>
+            <a:off x="3162300" y="1827505"/>
+            <a:ext cx="6280419" cy="4445279"/>
+          </a:xfrm>
+          <a:prstGeom prst="rect">
+            <a:avLst/>
+          </a:prstGeom>
+        </p:spPr>
+      </p:pic>
+    </p:spTree>
+    <p:extLst>
+      <p:ext uri="{BB962C8B-B14F-4D97-AF65-F5344CB8AC3E}">
+        <p14:creationId xmlns:p14="http://schemas.microsoft.com/office/powerpoint/2010/main" val="4039037107"/>
+      </p:ext>
+    </p:extLst>
+  </p:cSld>
+  <p:clrMapOvr>
+    <a:masterClrMapping/>
+  </p:clrMapOvr>
+</p:sld>
+</file>
+
 <file path=ppt/slides/slide2.xml><?xml version="1.0" encoding="utf-8"?>
 <p:sld xmlns:a="http://schemas.openxmlformats.org/drawingml/2006/main" xmlns:r="http://schemas.openxmlformats.org/officeDocument/2006/relationships" xmlns:p="http://schemas.openxmlformats.org/presentationml/2006/main">
   <p:cSld>
@@ -4035,14 +6906,34 @@
               </a:rPr>
               <a:t>Pandas vs Excel</a:t>
             </a:r>
-            <a:endParaRPr lang="en-GB" sz="1500" dirty="0">
-              <a:effectLst/>
-              <a:latin typeface="Calibri" panose="020F0502020204030204" pitchFamily="34" charset="0"/>
-              <a:ea typeface="Calibri" panose="020F0502020204030204" pitchFamily="34" charset="0"/>
-              <a:cs typeface="Times New Roman" panose="02020603050405020304" pitchFamily="18" charset="0"/>
-            </a:endParaRPr>
-          </a:p>
-          <a:p>
+            <a:r>
+              <a:rPr lang="en-GB" sz="1500" strike="noStrike" dirty="0">
+                <a:solidFill>
+                  <a:srgbClr val="4472C4"/>
+                </a:solidFill>
+                <a:effectLst/>
+                <a:latin typeface="Calibri" panose="020F0502020204030204" pitchFamily="34" charset="0"/>
+                <a:ea typeface="Calibri" panose="020F0502020204030204" pitchFamily="34" charset="0"/>
+                <a:cs typeface="Times New Roman" panose="02020603050405020304" pitchFamily="18" charset="0"/>
+              </a:rPr>
+              <a:t> </a:t>
+            </a:r>
+          </a:p>
+          <a:p>
+            <a:pPr>
+              <a:lnSpc>
+                <a:spcPct val="107000"/>
+              </a:lnSpc>
+              <a:spcBef>
+                <a:spcPts val="200"/>
+              </a:spcBef>
+            </a:pPr>
+            <a:r>
+              <a:rPr lang="en-GB" sz="1600" dirty="0">
+                <a:hlinkClick r:id="rId7"/>
+              </a:rPr>
+              <a:t>9 Reasons Excel Users Should Consider Learning Programming   </a:t>
+            </a:r>
             <a:endParaRPr lang="en-GB" sz="1600" dirty="0"/>
           </a:p>
         </p:txBody>
@@ -4100,7 +6991,7 @@
           <a:p>
             <a:r>
               <a:rPr lang="en-GB" dirty="0"/>
-              <a:t>A Brief Introduction to python</a:t>
+              <a:t>A Brief Introduction to python syntax</a:t>
             </a:r>
           </a:p>
         </p:txBody>
@@ -4623,7 +7514,7 @@
           <a:p>
             <a:r>
               <a:rPr lang="en-GB" dirty="0"/>
-              <a:t>A Brief Introduction to python</a:t>
+              <a:t>A Brief Introduction to python syntax</a:t>
             </a:r>
           </a:p>
         </p:txBody>
@@ -4911,7 +7802,7 @@
           <a:p>
             <a:r>
               <a:rPr lang="en-GB" dirty="0"/>
-              <a:t>A Brief Introduction to python</a:t>
+              <a:t>A Brief Introduction to python syntax</a:t>
             </a:r>
           </a:p>
         </p:txBody>
@@ -5379,6 +8270,168 @@
           <p:cNvPr id="2" name="Title 1">
             <a:extLst>
               <a:ext uri="{FF2B5EF4-FFF2-40B4-BE49-F238E27FC236}">
+                <a16:creationId xmlns:a16="http://schemas.microsoft.com/office/drawing/2014/main" id="{E855A230-C7D8-1FD6-6ACA-319B311A50CF}"/>
+              </a:ext>
+            </a:extLst>
+          </p:cNvPr>
+          <p:cNvSpPr>
+            <a:spLocks noGrp="1"/>
+          </p:cNvSpPr>
+          <p:nvPr>
+            <p:ph type="title"/>
+          </p:nvPr>
+        </p:nvSpPr>
+        <p:spPr/>
+        <p:txBody>
+          <a:bodyPr/>
+          <a:lstStyle/>
+          <a:p>
+            <a:r>
+              <a:rPr lang="en-GB" dirty="0"/>
+              <a:t>How to program</a:t>
+            </a:r>
+          </a:p>
+        </p:txBody>
+      </p:sp>
+      <p:sp>
+        <p:nvSpPr>
+          <p:cNvPr id="3" name="Content Placeholder 2">
+            <a:extLst>
+              <a:ext uri="{FF2B5EF4-FFF2-40B4-BE49-F238E27FC236}">
+                <a16:creationId xmlns:a16="http://schemas.microsoft.com/office/drawing/2014/main" id="{FAB04073-8FD5-0102-B0D3-86A414DEAFFF}"/>
+              </a:ext>
+            </a:extLst>
+          </p:cNvPr>
+          <p:cNvSpPr>
+            <a:spLocks noGrp="1"/>
+          </p:cNvSpPr>
+          <p:nvPr>
+            <p:ph idx="1"/>
+          </p:nvPr>
+        </p:nvSpPr>
+        <p:spPr/>
+        <p:txBody>
+          <a:bodyPr/>
+          <a:lstStyle/>
+          <a:p>
+            <a:pPr>
+              <a:buFont typeface="Courier New" panose="02070309020205020404" pitchFamily="49" charset="0"/>
+              <a:buChar char="o"/>
+            </a:pPr>
+            <a:r>
+              <a:rPr lang="en-GB" dirty="0"/>
+              <a:t> Google things!</a:t>
+            </a:r>
+          </a:p>
+          <a:p>
+            <a:pPr>
+              <a:buFont typeface="Courier New" panose="02070309020205020404" pitchFamily="49" charset="0"/>
+              <a:buChar char="o"/>
+            </a:pPr>
+            <a:endParaRPr lang="en-GB" dirty="0"/>
+          </a:p>
+          <a:p>
+            <a:pPr>
+              <a:buFont typeface="Courier New" panose="02070309020205020404" pitchFamily="49" charset="0"/>
+              <a:buChar char="o"/>
+            </a:pPr>
+            <a:r>
+              <a:rPr lang="en-GB" dirty="0"/>
+              <a:t> Other people will have likely had the same issues – Stack Overflow</a:t>
+            </a:r>
+          </a:p>
+          <a:p>
+            <a:pPr>
+              <a:buFont typeface="Courier New" panose="02070309020205020404" pitchFamily="49" charset="0"/>
+              <a:buChar char="o"/>
+            </a:pPr>
+            <a:endParaRPr lang="en-GB" dirty="0"/>
+          </a:p>
+          <a:p>
+            <a:pPr>
+              <a:buFont typeface="Courier New" panose="02070309020205020404" pitchFamily="49" charset="0"/>
+              <a:buChar char="o"/>
+            </a:pPr>
+            <a:r>
+              <a:rPr lang="en-GB" dirty="0"/>
+              <a:t> Functions aren’t always intuitive - Refer to the documentation</a:t>
+            </a:r>
+          </a:p>
+          <a:p>
+            <a:pPr>
+              <a:buFont typeface="Courier New" panose="02070309020205020404" pitchFamily="49" charset="0"/>
+              <a:buChar char="o"/>
+            </a:pPr>
+            <a:endParaRPr lang="en-GB" dirty="0"/>
+          </a:p>
+          <a:p>
+            <a:pPr>
+              <a:buFont typeface="Courier New" panose="02070309020205020404" pitchFamily="49" charset="0"/>
+              <a:buChar char="o"/>
+            </a:pPr>
+            <a:r>
+              <a:rPr lang="en-GB" dirty="0"/>
+              <a:t> Talk yourself through your code – understand what you are writing</a:t>
+            </a:r>
+          </a:p>
+          <a:p>
+            <a:pPr>
+              <a:buFont typeface="Courier New" panose="02070309020205020404" pitchFamily="49" charset="0"/>
+              <a:buChar char="o"/>
+            </a:pPr>
+            <a:endParaRPr lang="en-GB" dirty="0"/>
+          </a:p>
+          <a:p>
+            <a:pPr>
+              <a:buFont typeface="Courier New" panose="02070309020205020404" pitchFamily="49" charset="0"/>
+              <a:buChar char="o"/>
+            </a:pPr>
+            <a:endParaRPr lang="en-GB" dirty="0"/>
+          </a:p>
+          <a:p>
+            <a:pPr>
+              <a:buFont typeface="Courier New" panose="02070309020205020404" pitchFamily="49" charset="0"/>
+              <a:buChar char="o"/>
+            </a:pPr>
+            <a:endParaRPr lang="en-GB" dirty="0"/>
+          </a:p>
+        </p:txBody>
+      </p:sp>
+    </p:spTree>
+    <p:extLst>
+      <p:ext uri="{BB962C8B-B14F-4D97-AF65-F5344CB8AC3E}">
+        <p14:creationId xmlns:p14="http://schemas.microsoft.com/office/powerpoint/2010/main" val="735825990"/>
+      </p:ext>
+    </p:extLst>
+  </p:cSld>
+  <p:clrMapOvr>
+    <a:masterClrMapping/>
+  </p:clrMapOvr>
+</p:sld>
+</file>
+
+<file path=ppt/slides/slide9.xml><?xml version="1.0" encoding="utf-8"?>
+<p:sld xmlns:a="http://schemas.openxmlformats.org/drawingml/2006/main" xmlns:r="http://schemas.openxmlformats.org/officeDocument/2006/relationships" xmlns:p="http://schemas.openxmlformats.org/presentationml/2006/main">
+  <p:cSld>
+    <p:spTree>
+      <p:nvGrpSpPr>
+        <p:cNvPr id="1" name=""/>
+        <p:cNvGrpSpPr/>
+        <p:nvPr/>
+      </p:nvGrpSpPr>
+      <p:grpSpPr>
+        <a:xfrm>
+          <a:off x="0" y="0"/>
+          <a:ext cx="0" cy="0"/>
+          <a:chOff x="0" y="0"/>
+          <a:chExt cx="0" cy="0"/>
+        </a:xfrm>
+      </p:grpSpPr>
+      <p:sp>
+        <p:nvSpPr>
+          <p:cNvPr id="2" name="Title 1">
+            <a:extLst>
+              <a:ext uri="{FF2B5EF4-FFF2-40B4-BE49-F238E27FC236}">
                 <a16:creationId xmlns:a16="http://schemas.microsoft.com/office/drawing/2014/main" id="{1757FB44-AAF1-968E-09C8-2E7F01CE041B}"/>
               </a:ext>
             </a:extLst>
@@ -5425,11 +8478,13 @@
           <a:p>
             <a:r>
               <a:rPr lang="en-GB" dirty="0"/>
-              <a:t>A modular, and heavily commented step-by-step guide to how you would recreate triangles and </a:t>
-            </a:r>
-            <a:r>
-              <a:rPr lang="en-GB"/>
-              <a:t>graphs using pandas.</a:t>
+              <a:t>A modular, and heavily commented step-by-step guide on how you would recreate triangles and graphs using pandas.</a:t>
+            </a:r>
+          </a:p>
+          <a:p>
+            <a:r>
+              <a:rPr lang="en-GB" dirty="0"/>
+              <a:t>Pandas is a python package created for data manipulation and analysis.</a:t>
             </a:r>
           </a:p>
           <a:p>
@@ -5716,4 +8771,299 @@
     </a:ext>
   </a:extLst>
 </a:theme>
+</file>
+
+<file path=ppt/theme/theme2.xml><?xml version="1.0" encoding="utf-8"?>
+<a:theme xmlns:a="http://schemas.openxmlformats.org/drawingml/2006/main" name="Office Theme">
+  <a:themeElements>
+    <a:clrScheme name="Office">
+      <a:dk1>
+        <a:sysClr val="windowText" lastClr="000000"/>
+      </a:dk1>
+      <a:lt1>
+        <a:sysClr val="window" lastClr="FFFFFF"/>
+      </a:lt1>
+      <a:dk2>
+        <a:srgbClr val="44546A"/>
+      </a:dk2>
+      <a:lt2>
+        <a:srgbClr val="E7E6E6"/>
+      </a:lt2>
+      <a:accent1>
+        <a:srgbClr val="4472C4"/>
+      </a:accent1>
+      <a:accent2>
+        <a:srgbClr val="ED7D31"/>
+      </a:accent2>
+      <a:accent3>
+        <a:srgbClr val="A5A5A5"/>
+      </a:accent3>
+      <a:accent4>
+        <a:srgbClr val="FFC000"/>
+      </a:accent4>
+      <a:accent5>
+        <a:srgbClr val="5B9BD5"/>
+      </a:accent5>
+      <a:accent6>
+        <a:srgbClr val="70AD47"/>
+      </a:accent6>
+      <a:hlink>
+        <a:srgbClr val="0563C1"/>
+      </a:hlink>
+      <a:folHlink>
+        <a:srgbClr val="954F72"/>
+      </a:folHlink>
+    </a:clrScheme>
+    <a:fontScheme name="Office">
+      <a:majorFont>
+        <a:latin typeface="Calibri Light" panose="020F0302020204030204"/>
+        <a:ea typeface=""/>
+        <a:cs typeface=""/>
+        <a:font script="Jpan" typeface="游ゴシック Light"/>
+        <a:font script="Hang" typeface="맑은 고딕"/>
+        <a:font script="Hans" typeface="等线 Light"/>
+        <a:font script="Hant" typeface="新細明體"/>
+        <a:font script="Arab" typeface="Times New Roman"/>
+        <a:font script="Hebr" typeface="Times New Roman"/>
+        <a:font script="Thai" typeface="Angsana New"/>
+        <a:font script="Ethi" typeface="Nyala"/>
+        <a:font script="Beng" typeface="Vrinda"/>
+        <a:font script="Gujr" typeface="Shruti"/>
+        <a:font script="Khmr" typeface="MoolBoran"/>
+        <a:font script="Knda" typeface="Tunga"/>
+        <a:font script="Guru" typeface="Raavi"/>
+        <a:font script="Cans" typeface="Euphemia"/>
+        <a:font script="Cher" typeface="Plantagenet Cherokee"/>
+        <a:font script="Yiii" typeface="Microsoft Yi Baiti"/>
+        <a:font script="Tibt" typeface="Microsoft Himalaya"/>
+        <a:font script="Thaa" typeface="MV Boli"/>
+        <a:font script="Deva" typeface="Mangal"/>
+        <a:font script="Telu" typeface="Gautami"/>
+        <a:font script="Taml" typeface="Latha"/>
+        <a:font script="Syrc" typeface="Estrangelo Edessa"/>
+        <a:font script="Orya" typeface="Kalinga"/>
+        <a:font script="Mlym" typeface="Kartika"/>
+        <a:font script="Laoo" typeface="DokChampa"/>
+        <a:font script="Sinh" typeface="Iskoola Pota"/>
+        <a:font script="Mong" typeface="Mongolian Baiti"/>
+        <a:font script="Viet" typeface="Times New Roman"/>
+        <a:font script="Uigh" typeface="Microsoft Uighur"/>
+        <a:font script="Geor" typeface="Sylfaen"/>
+        <a:font script="Armn" typeface="Arial"/>
+        <a:font script="Bugi" typeface="Leelawadee UI"/>
+        <a:font script="Bopo" typeface="Microsoft JhengHei"/>
+        <a:font script="Java" typeface="Javanese Text"/>
+        <a:font script="Lisu" typeface="Segoe UI"/>
+        <a:font script="Mymr" typeface="Myanmar Text"/>
+        <a:font script="Nkoo" typeface="Ebrima"/>
+        <a:font script="Olck" typeface="Nirmala UI"/>
+        <a:font script="Osma" typeface="Ebrima"/>
+        <a:font script="Phag" typeface="Phagspa"/>
+        <a:font script="Syrn" typeface="Estrangelo Edessa"/>
+        <a:font script="Syrj" typeface="Estrangelo Edessa"/>
+        <a:font script="Syre" typeface="Estrangelo Edessa"/>
+        <a:font script="Sora" typeface="Nirmala UI"/>
+        <a:font script="Tale" typeface="Microsoft Tai Le"/>
+        <a:font script="Talu" typeface="Microsoft New Tai Lue"/>
+        <a:font script="Tfng" typeface="Ebrima"/>
+      </a:majorFont>
+      <a:minorFont>
+        <a:latin typeface="Calibri" panose="020F0502020204030204"/>
+        <a:ea typeface=""/>
+        <a:cs typeface=""/>
+        <a:font script="Jpan" typeface="游ゴシック"/>
+        <a:font script="Hang" typeface="맑은 고딕"/>
+        <a:font script="Hans" typeface="等线"/>
+        <a:font script="Hant" typeface="新細明體"/>
+        <a:font script="Arab" typeface="Arial"/>
+        <a:font script="Hebr" typeface="Arial"/>
+        <a:font script="Thai" typeface="Cordia New"/>
+        <a:font script="Ethi" typeface="Nyala"/>
+        <a:font script="Beng" typeface="Vrinda"/>
+        <a:font script="Gujr" typeface="Shruti"/>
+        <a:font script="Khmr" typeface="DaunPenh"/>
+        <a:font script="Knda" typeface="Tunga"/>
+        <a:font script="Guru" typeface="Raavi"/>
+        <a:font script="Cans" typeface="Euphemia"/>
+        <a:font script="Cher" typeface="Plantagenet Cherokee"/>
+        <a:font script="Yiii" typeface="Microsoft Yi Baiti"/>
+        <a:font script="Tibt" typeface="Microsoft Himalaya"/>
+        <a:font script="Thaa" typeface="MV Boli"/>
+        <a:font script="Deva" typeface="Mangal"/>
+        <a:font script="Telu" typeface="Gautami"/>
+        <a:font script="Taml" typeface="Latha"/>
+        <a:font script="Syrc" typeface="Estrangelo Edessa"/>
+        <a:font script="Orya" typeface="Kalinga"/>
+        <a:font script="Mlym" typeface="Kartika"/>
+        <a:font script="Laoo" typeface="DokChampa"/>
+        <a:font script="Sinh" typeface="Iskoola Pota"/>
+        <a:font script="Mong" typeface="Mongolian Baiti"/>
+        <a:font script="Viet" typeface="Arial"/>
+        <a:font script="Uigh" typeface="Microsoft Uighur"/>
+        <a:font script="Geor" typeface="Sylfaen"/>
+        <a:font script="Armn" typeface="Arial"/>
+        <a:font script="Bugi" typeface="Leelawadee UI"/>
+        <a:font script="Bopo" typeface="Microsoft JhengHei"/>
+        <a:font script="Java" typeface="Javanese Text"/>
+        <a:font script="Lisu" typeface="Segoe UI"/>
+        <a:font script="Mymr" typeface="Myanmar Text"/>
+        <a:font script="Nkoo" typeface="Ebrima"/>
+        <a:font script="Olck" typeface="Nirmala UI"/>
+        <a:font script="Osma" typeface="Ebrima"/>
+        <a:font script="Phag" typeface="Phagspa"/>
+        <a:font script="Syrn" typeface="Estrangelo Edessa"/>
+        <a:font script="Syrj" typeface="Estrangelo Edessa"/>
+        <a:font script="Syre" typeface="Estrangelo Edessa"/>
+        <a:font script="Sora" typeface="Nirmala UI"/>
+        <a:font script="Tale" typeface="Microsoft Tai Le"/>
+        <a:font script="Talu" typeface="Microsoft New Tai Lue"/>
+        <a:font script="Tfng" typeface="Ebrima"/>
+      </a:minorFont>
+    </a:fontScheme>
+    <a:fmtScheme name="Office">
+      <a:fillStyleLst>
+        <a:solidFill>
+          <a:schemeClr val="phClr"/>
+        </a:solidFill>
+        <a:gradFill rotWithShape="1">
+          <a:gsLst>
+            <a:gs pos="0">
+              <a:schemeClr val="phClr">
+                <a:lumMod val="110000"/>
+                <a:satMod val="105000"/>
+                <a:tint val="67000"/>
+              </a:schemeClr>
+            </a:gs>
+            <a:gs pos="50000">
+              <a:schemeClr val="phClr">
+                <a:lumMod val="105000"/>
+                <a:satMod val="103000"/>
+                <a:tint val="73000"/>
+              </a:schemeClr>
+            </a:gs>
+            <a:gs pos="100000">
+              <a:schemeClr val="phClr">
+                <a:lumMod val="105000"/>
+                <a:satMod val="109000"/>
+                <a:tint val="81000"/>
+              </a:schemeClr>
+            </a:gs>
+          </a:gsLst>
+          <a:lin ang="5400000" scaled="0"/>
+        </a:gradFill>
+        <a:gradFill rotWithShape="1">
+          <a:gsLst>
+            <a:gs pos="0">
+              <a:schemeClr val="phClr">
+                <a:satMod val="103000"/>
+                <a:lumMod val="102000"/>
+                <a:tint val="94000"/>
+              </a:schemeClr>
+            </a:gs>
+            <a:gs pos="50000">
+              <a:schemeClr val="phClr">
+                <a:satMod val="110000"/>
+                <a:lumMod val="100000"/>
+                <a:shade val="100000"/>
+              </a:schemeClr>
+            </a:gs>
+            <a:gs pos="100000">
+              <a:schemeClr val="phClr">
+                <a:lumMod val="99000"/>
+                <a:satMod val="120000"/>
+                <a:shade val="78000"/>
+              </a:schemeClr>
+            </a:gs>
+          </a:gsLst>
+          <a:lin ang="5400000" scaled="0"/>
+        </a:gradFill>
+      </a:fillStyleLst>
+      <a:lnStyleLst>
+        <a:ln w="6350" cap="flat" cmpd="sng" algn="ctr">
+          <a:solidFill>
+            <a:schemeClr val="phClr"/>
+          </a:solidFill>
+          <a:prstDash val="solid"/>
+          <a:miter lim="800000"/>
+        </a:ln>
+        <a:ln w="12700" cap="flat" cmpd="sng" algn="ctr">
+          <a:solidFill>
+            <a:schemeClr val="phClr"/>
+          </a:solidFill>
+          <a:prstDash val="solid"/>
+          <a:miter lim="800000"/>
+        </a:ln>
+        <a:ln w="19050" cap="flat" cmpd="sng" algn="ctr">
+          <a:solidFill>
+            <a:schemeClr val="phClr"/>
+          </a:solidFill>
+          <a:prstDash val="solid"/>
+          <a:miter lim="800000"/>
+        </a:ln>
+      </a:lnStyleLst>
+      <a:effectStyleLst>
+        <a:effectStyle>
+          <a:effectLst/>
+        </a:effectStyle>
+        <a:effectStyle>
+          <a:effectLst/>
+        </a:effectStyle>
+        <a:effectStyle>
+          <a:effectLst>
+            <a:outerShdw blurRad="57150" dist="19050" dir="5400000" algn="ctr" rotWithShape="0">
+              <a:srgbClr val="000000">
+                <a:alpha val="63000"/>
+              </a:srgbClr>
+            </a:outerShdw>
+          </a:effectLst>
+        </a:effectStyle>
+      </a:effectStyleLst>
+      <a:bgFillStyleLst>
+        <a:solidFill>
+          <a:schemeClr val="phClr"/>
+        </a:solidFill>
+        <a:solidFill>
+          <a:schemeClr val="phClr">
+            <a:tint val="95000"/>
+            <a:satMod val="170000"/>
+          </a:schemeClr>
+        </a:solidFill>
+        <a:gradFill rotWithShape="1">
+          <a:gsLst>
+            <a:gs pos="0">
+              <a:schemeClr val="phClr">
+                <a:tint val="93000"/>
+                <a:satMod val="150000"/>
+                <a:shade val="98000"/>
+                <a:lumMod val="102000"/>
+              </a:schemeClr>
+            </a:gs>
+            <a:gs pos="50000">
+              <a:schemeClr val="phClr">
+                <a:tint val="98000"/>
+                <a:satMod val="130000"/>
+                <a:shade val="90000"/>
+                <a:lumMod val="103000"/>
+              </a:schemeClr>
+            </a:gs>
+            <a:gs pos="100000">
+              <a:schemeClr val="phClr">
+                <a:shade val="63000"/>
+                <a:satMod val="120000"/>
+              </a:schemeClr>
+            </a:gs>
+          </a:gsLst>
+          <a:lin ang="5400000" scaled="0"/>
+        </a:gradFill>
+      </a:bgFillStyleLst>
+    </a:fmtScheme>
+  </a:themeElements>
+  <a:objectDefaults/>
+  <a:extraClrSchemeLst/>
+  <a:extLst>
+    <a:ext uri="{05A4C25C-085E-4340-85A3-A5531E510DB2}">
+      <thm15:themeFamily xmlns:thm15="http://schemas.microsoft.com/office/thememl/2012/main" name="Office Theme" id="{62F939B6-93AF-4DB8-9C6B-D6C7DFDC589F}" vid="{4A3C46E8-61CC-4603-A589-7422A47A8E4A}"/>
+    </a:ext>
+  </a:extLst>
+</a:theme>
 </file>
</xml_diff>